<commit_message>
DB EF - Database First
</commit_message>
<xml_diff>
--- a/C#/DB/Entity Framework Core/01.Fetching Resultsets With ADO.NET/01. DB-Advanced-EF-Core-DB-Apps-Introduction.pptx
+++ b/C#/DB/Entity Framework Core/01.Fetching Resultsets With ADO.NET/01. DB-Advanced-EF-Core-DB-Apps-Introduction.pptx
@@ -221,7 +221,7 @@
       </p14:sectionLst>
     </p:ext>
     <p:ext uri="{EFAFB233-063F-42B5-8137-9DF3F51BA10A}">
-      <p15:sldGuideLst xmlns:p15="http://schemas.microsoft.com/office/powerpoint/2012/main">
+      <p15:sldGuideLst xmlns:p15="http://schemas.microsoft.com/office/powerpoint/2012/main" xmlns="">
         <p15:guide id="1" orient="horz" pos="2160" userDrawn="1">
           <p15:clr>
             <a:srgbClr val="A4A3A4"/>
@@ -235,7 +235,7 @@
       </p15:sldGuideLst>
     </p:ext>
     <p:ext uri="{2D200454-40CA-4A62-9FC3-DE9A4176ACB9}">
-      <p15:notesGuideLst xmlns:p15="http://schemas.microsoft.com/office/powerpoint/2012/main">
+      <p15:notesGuideLst xmlns:p15="http://schemas.microsoft.com/office/powerpoint/2012/main" xmlns="">
         <p15:guide id="1" orient="horz" pos="2880">
           <p15:clr>
             <a:srgbClr val="A4A3A4"/>
@@ -335,7 +335,7 @@
             <a:fld id="{FE5B4EDC-59C0-49C7-8ADA-5A781B329E02}" type="datetimeFigureOut">
               <a:rPr lang="en-US"/>
               <a:pPr/>
-              <a:t>10/21/2019</a:t>
+              <a:t>11/5/2019</a:t>
             </a:fld>
             <a:endParaRPr dirty="0"/>
           </a:p>
@@ -534,7 +534,7 @@
             <a:fld id="{F2D8D46A-B586-417D-BFBD-8C8FE0AAF762}" type="datetimeFigureOut">
               <a:rPr lang="en-US" smtClean="0"/>
               <a:pPr/>
-              <a:t>10/21/2019</a:t>
+              <a:t>11/5/2019</a:t>
             </a:fld>
             <a:endParaRPr lang="en-US" dirty="0"/>
           </a:p>
@@ -3473,7 +3473,7 @@
           <p:cNvPr id="17" name="Picture 16">
             <a:extLst>
               <a:ext uri="{FF2B5EF4-FFF2-40B4-BE49-F238E27FC236}">
-                <a16:creationId xmlns:a16="http://schemas.microsoft.com/office/drawing/2014/main" id="{5B5A345C-2CD0-4932-A998-37B2D20BF028}"/>
+                <a16:creationId xmlns:a16="http://schemas.microsoft.com/office/drawing/2014/main" xmlns="" id="{5B5A345C-2CD0-4932-A998-37B2D20BF028}"/>
               </a:ext>
             </a:extLst>
           </p:cNvPr>
@@ -3502,7 +3502,7 @@
           <p:cNvPr id="33" name="Picture Placeholder 32">
             <a:extLst>
               <a:ext uri="{FF2B5EF4-FFF2-40B4-BE49-F238E27FC236}">
-                <a16:creationId xmlns:a16="http://schemas.microsoft.com/office/drawing/2014/main" id="{A04D819A-89E2-4714-8C56-1838BF467EF7}"/>
+                <a16:creationId xmlns:a16="http://schemas.microsoft.com/office/drawing/2014/main" xmlns="" id="{A04D819A-89E2-4714-8C56-1838BF467EF7}"/>
               </a:ext>
             </a:extLst>
           </p:cNvPr>
@@ -3545,7 +3545,7 @@
           <p:cNvPr id="35" name="Picture 34">
             <a:extLst>
               <a:ext uri="{FF2B5EF4-FFF2-40B4-BE49-F238E27FC236}">
-                <a16:creationId xmlns:a16="http://schemas.microsoft.com/office/drawing/2014/main" id="{951E7DA9-C5F0-43D9-B013-3BDF9EEF029D}"/>
+                <a16:creationId xmlns:a16="http://schemas.microsoft.com/office/drawing/2014/main" xmlns="" id="{951E7DA9-C5F0-43D9-B013-3BDF9EEF029D}"/>
               </a:ext>
             </a:extLst>
           </p:cNvPr>
@@ -3580,7 +3580,7 @@
           <p:cNvPr id="43" name="Subtitle 5">
             <a:extLst>
               <a:ext uri="{FF2B5EF4-FFF2-40B4-BE49-F238E27FC236}">
-                <a16:creationId xmlns:a16="http://schemas.microsoft.com/office/drawing/2014/main" id="{37BDB812-1395-4B02-ABCF-6A331EEE23E5}"/>
+                <a16:creationId xmlns:a16="http://schemas.microsoft.com/office/drawing/2014/main" xmlns="" id="{37BDB812-1395-4B02-ABCF-6A331EEE23E5}"/>
               </a:ext>
             </a:extLst>
           </p:cNvPr>
@@ -3628,7 +3628,7 @@
           <p:cNvPr id="19" name="Picture 18">
             <a:extLst>
               <a:ext uri="{FF2B5EF4-FFF2-40B4-BE49-F238E27FC236}">
-                <a16:creationId xmlns:a16="http://schemas.microsoft.com/office/drawing/2014/main" id="{4FAEB7CD-FF73-4344-9FE5-589B30F5AAF7}"/>
+                <a16:creationId xmlns:a16="http://schemas.microsoft.com/office/drawing/2014/main" xmlns="" id="{4FAEB7CD-FF73-4344-9FE5-589B30F5AAF7}"/>
               </a:ext>
             </a:extLst>
           </p:cNvPr>
@@ -3664,7 +3664,7 @@
           <p:cNvPr id="10" name="Picture 9">
             <a:extLst>
               <a:ext uri="{FF2B5EF4-FFF2-40B4-BE49-F238E27FC236}">
-                <a16:creationId xmlns:a16="http://schemas.microsoft.com/office/drawing/2014/main" id="{82DFEC2C-38C6-405B-AD0A-06879C50EFEE}"/>
+                <a16:creationId xmlns:a16="http://schemas.microsoft.com/office/drawing/2014/main" xmlns="" id="{82DFEC2C-38C6-405B-AD0A-06879C50EFEE}"/>
               </a:ext>
             </a:extLst>
           </p:cNvPr>
@@ -3699,7 +3699,7 @@
           <p:cNvPr id="15" name="Picture 14">
             <a:extLst>
               <a:ext uri="{FF2B5EF4-FFF2-40B4-BE49-F238E27FC236}">
-                <a16:creationId xmlns:a16="http://schemas.microsoft.com/office/drawing/2014/main" id="{D7483B54-1DD1-4FC4-9FA0-4872F8C409C8}"/>
+                <a16:creationId xmlns:a16="http://schemas.microsoft.com/office/drawing/2014/main" xmlns="" id="{D7483B54-1DD1-4FC4-9FA0-4872F8C409C8}"/>
               </a:ext>
             </a:extLst>
           </p:cNvPr>
@@ -3734,7 +3734,7 @@
           <p:cNvPr id="2" name="Title 1">
             <a:extLst>
               <a:ext uri="{FF2B5EF4-FFF2-40B4-BE49-F238E27FC236}">
-                <a16:creationId xmlns:a16="http://schemas.microsoft.com/office/drawing/2014/main" id="{A4DF3AB8-E6E3-4FCE-8A4A-ECD147720A5D}"/>
+                <a16:creationId xmlns:a16="http://schemas.microsoft.com/office/drawing/2014/main" xmlns="" id="{A4DF3AB8-E6E3-4FCE-8A4A-ECD147720A5D}"/>
               </a:ext>
             </a:extLst>
           </p:cNvPr>
@@ -3772,7 +3772,7 @@
             <a:hlinkClick r:id="rId7" tooltip="This work is licensed under the &quot;Creative Commons Attribution-NonCommercial-ShareAlike 4.0 International&quot; license"/>
             <a:extLst>
               <a:ext uri="{FF2B5EF4-FFF2-40B4-BE49-F238E27FC236}">
-                <a16:creationId xmlns:a16="http://schemas.microsoft.com/office/drawing/2014/main" id="{7CB336FF-A768-4CE1-B1CE-FC103B348EA1}"/>
+                <a16:creationId xmlns:a16="http://schemas.microsoft.com/office/drawing/2014/main" xmlns="" id="{7CB336FF-A768-4CE1-B1CE-FC103B348EA1}"/>
               </a:ext>
             </a:extLst>
           </p:cNvPr>
@@ -3825,7 +3825,7 @@
           <p:cNvPr id="30" name="Text Placeholder 13">
             <a:extLst>
               <a:ext uri="{FF2B5EF4-FFF2-40B4-BE49-F238E27FC236}">
-                <a16:creationId xmlns:a16="http://schemas.microsoft.com/office/drawing/2014/main" id="{2EA92DCA-4DB5-4D03-ACD3-A6A296592D0C}"/>
+                <a16:creationId xmlns:a16="http://schemas.microsoft.com/office/drawing/2014/main" xmlns="" id="{2EA92DCA-4DB5-4D03-ACD3-A6A296592D0C}"/>
               </a:ext>
             </a:extLst>
           </p:cNvPr>
@@ -3887,7 +3887,7 @@
           <p:cNvPr id="31" name="Text Placeholder 13">
             <a:extLst>
               <a:ext uri="{FF2B5EF4-FFF2-40B4-BE49-F238E27FC236}">
-                <a16:creationId xmlns:a16="http://schemas.microsoft.com/office/drawing/2014/main" id="{3E6B87B7-9D33-4EBB-BD4F-C0436BA3FD72}"/>
+                <a16:creationId xmlns:a16="http://schemas.microsoft.com/office/drawing/2014/main" xmlns="" id="{3E6B87B7-9D33-4EBB-BD4F-C0436BA3FD72}"/>
               </a:ext>
             </a:extLst>
           </p:cNvPr>
@@ -3949,7 +3949,7 @@
           <p:cNvPr id="36" name="Text Placeholder 13">
             <a:extLst>
               <a:ext uri="{FF2B5EF4-FFF2-40B4-BE49-F238E27FC236}">
-                <a16:creationId xmlns:a16="http://schemas.microsoft.com/office/drawing/2014/main" id="{3B21F47B-DE1F-442D-A2B7-6866F8786704}"/>
+                <a16:creationId xmlns:a16="http://schemas.microsoft.com/office/drawing/2014/main" xmlns="" id="{3B21F47B-DE1F-442D-A2B7-6866F8786704}"/>
               </a:ext>
             </a:extLst>
           </p:cNvPr>
@@ -4009,7 +4009,7 @@
           <p:cNvPr id="40" name="Text Placeholder 13">
             <a:extLst>
               <a:ext uri="{FF2B5EF4-FFF2-40B4-BE49-F238E27FC236}">
-                <a16:creationId xmlns:a16="http://schemas.microsoft.com/office/drawing/2014/main" id="{CD940256-851E-46C8-8BFB-A5ECA6C7DA07}"/>
+                <a16:creationId xmlns:a16="http://schemas.microsoft.com/office/drawing/2014/main" xmlns="" id="{CD940256-851E-46C8-8BFB-A5ECA6C7DA07}"/>
               </a:ext>
             </a:extLst>
           </p:cNvPr>
@@ -4069,7 +4069,7 @@
           <p:cNvPr id="16" name="Rectangle 15">
             <a:extLst>
               <a:ext uri="{FF2B5EF4-FFF2-40B4-BE49-F238E27FC236}">
-                <a16:creationId xmlns:a16="http://schemas.microsoft.com/office/drawing/2014/main" id="{6854D183-0374-4B3E-B2CE-32F308A81591}"/>
+                <a16:creationId xmlns:a16="http://schemas.microsoft.com/office/drawing/2014/main" xmlns="" id="{6854D183-0374-4B3E-B2CE-32F308A81591}"/>
               </a:ext>
             </a:extLst>
           </p:cNvPr>
@@ -4166,7 +4166,7 @@
   <p:hf hdr="0" ftr="0" dt="0"/>
   <p:extLst mod="1">
     <p:ext uri="{DCECCB84-F9BA-43D5-87BE-67443E8EF086}">
-      <p15:sldGuideLst xmlns:p15="http://schemas.microsoft.com/office/powerpoint/2012/main">
+      <p15:sldGuideLst xmlns:p15="http://schemas.microsoft.com/office/powerpoint/2012/main" xmlns="">
         <p15:guide id="1" orient="horz" pos="2160">
           <p15:clr>
             <a:srgbClr val="FBAE40"/>
@@ -4205,7 +4205,7 @@
           <p:cNvPr id="11" name="Picture 10">
             <a:extLst>
               <a:ext uri="{FF2B5EF4-FFF2-40B4-BE49-F238E27FC236}">
-                <a16:creationId xmlns:a16="http://schemas.microsoft.com/office/drawing/2014/main" id="{23609A8D-9063-4A88-A094-81A65D7DF417}"/>
+                <a16:creationId xmlns:a16="http://schemas.microsoft.com/office/drawing/2014/main" xmlns="" id="{23609A8D-9063-4A88-A094-81A65D7DF417}"/>
               </a:ext>
             </a:extLst>
           </p:cNvPr>
@@ -4234,7 +4234,7 @@
           <p:cNvPr id="17" name="Rectangle 16">
             <a:extLst>
               <a:ext uri="{FF2B5EF4-FFF2-40B4-BE49-F238E27FC236}">
-                <a16:creationId xmlns:a16="http://schemas.microsoft.com/office/drawing/2014/main" id="{4880F1A8-532C-4443-BDB9-44438A972E15}"/>
+                <a16:creationId xmlns:a16="http://schemas.microsoft.com/office/drawing/2014/main" xmlns="" id="{4880F1A8-532C-4443-BDB9-44438A972E15}"/>
               </a:ext>
             </a:extLst>
           </p:cNvPr>
@@ -4544,7 +4544,7 @@
           <p:cNvPr id="10" name="Rectangle 9">
             <a:extLst>
               <a:ext uri="{FF2B5EF4-FFF2-40B4-BE49-F238E27FC236}">
-                <a16:creationId xmlns:a16="http://schemas.microsoft.com/office/drawing/2014/main" id="{E9B994EC-35A8-4A11-98CB-25DC28852F94}"/>
+                <a16:creationId xmlns:a16="http://schemas.microsoft.com/office/drawing/2014/main" xmlns="" id="{E9B994EC-35A8-4A11-98CB-25DC28852F94}"/>
               </a:ext>
             </a:extLst>
           </p:cNvPr>
@@ -4625,7 +4625,7 @@
           <p:cNvPr id="14" name="Text Placeholder 13">
             <a:extLst>
               <a:ext uri="{FF2B5EF4-FFF2-40B4-BE49-F238E27FC236}">
-                <a16:creationId xmlns:a16="http://schemas.microsoft.com/office/drawing/2014/main" id="{A2ABE920-240F-4CF6-AD45-23ED489FAD6E}"/>
+                <a16:creationId xmlns:a16="http://schemas.microsoft.com/office/drawing/2014/main" xmlns="" id="{A2ABE920-240F-4CF6-AD45-23ED489FAD6E}"/>
               </a:ext>
             </a:extLst>
           </p:cNvPr>
@@ -4688,7 +4688,7 @@
           <p:cNvPr id="6" name="Title 5">
             <a:extLst>
               <a:ext uri="{FF2B5EF4-FFF2-40B4-BE49-F238E27FC236}">
-                <a16:creationId xmlns:a16="http://schemas.microsoft.com/office/drawing/2014/main" id="{2FF342A0-26CC-4ADA-AB90-FC4810F88E91}"/>
+                <a16:creationId xmlns:a16="http://schemas.microsoft.com/office/drawing/2014/main" xmlns="" id="{2FF342A0-26CC-4ADA-AB90-FC4810F88E91}"/>
               </a:ext>
             </a:extLst>
           </p:cNvPr>
@@ -4724,7 +4724,7 @@
           <p:cNvPr id="8" name="Date Placeholder 7">
             <a:extLst>
               <a:ext uri="{FF2B5EF4-FFF2-40B4-BE49-F238E27FC236}">
-                <a16:creationId xmlns:a16="http://schemas.microsoft.com/office/drawing/2014/main" id="{A66184F8-77F5-4000-AA69-383B07AEEF0D}"/>
+                <a16:creationId xmlns:a16="http://schemas.microsoft.com/office/drawing/2014/main" xmlns="" id="{A66184F8-77F5-4000-AA69-383B07AEEF0D}"/>
               </a:ext>
             </a:extLst>
           </p:cNvPr>
@@ -4743,7 +4743,7 @@
             <a:fld id="{055373AC-9AA7-423B-BA00-BA1C74164DBD}" type="datetime1">
               <a:rPr lang="en-US" smtClean="0"/>
               <a:pPr/>
-              <a:t>10/21/2019</a:t>
+              <a:t>11/5/2019</a:t>
             </a:fld>
             <a:endParaRPr lang="en-US" dirty="0"/>
           </a:p>
@@ -4754,7 +4754,7 @@
           <p:cNvPr id="9" name="Footer Placeholder 8">
             <a:extLst>
               <a:ext uri="{FF2B5EF4-FFF2-40B4-BE49-F238E27FC236}">
-                <a16:creationId xmlns:a16="http://schemas.microsoft.com/office/drawing/2014/main" id="{9CAD63B7-3B55-42B3-B63C-7488630C399B}"/>
+                <a16:creationId xmlns:a16="http://schemas.microsoft.com/office/drawing/2014/main" xmlns="" id="{9CAD63B7-3B55-42B3-B63C-7488630C399B}"/>
               </a:ext>
             </a:extLst>
           </p:cNvPr>
@@ -4779,7 +4779,7 @@
           <p:cNvPr id="15" name="Slide Number Placeholder 14">
             <a:extLst>
               <a:ext uri="{FF2B5EF4-FFF2-40B4-BE49-F238E27FC236}">
-                <a16:creationId xmlns:a16="http://schemas.microsoft.com/office/drawing/2014/main" id="{97A1733E-05EA-4892-9222-96356ACBDF86}"/>
+                <a16:creationId xmlns:a16="http://schemas.microsoft.com/office/drawing/2014/main" xmlns="" id="{97A1733E-05EA-4892-9222-96356ACBDF86}"/>
               </a:ext>
             </a:extLst>
           </p:cNvPr>
@@ -4809,7 +4809,7 @@
           <p:cNvPr id="16" name="Picture 15">
             <a:extLst>
               <a:ext uri="{FF2B5EF4-FFF2-40B4-BE49-F238E27FC236}">
-                <a16:creationId xmlns:a16="http://schemas.microsoft.com/office/drawing/2014/main" id="{2FE050E4-DC54-4CF4-A8D3-DC8B8DA04ECB}"/>
+                <a16:creationId xmlns:a16="http://schemas.microsoft.com/office/drawing/2014/main" xmlns="" id="{2FE050E4-DC54-4CF4-A8D3-DC8B8DA04ECB}"/>
               </a:ext>
             </a:extLst>
           </p:cNvPr>
@@ -4892,7 +4892,7 @@
           <p:cNvPr id="56" name="Picture 55">
             <a:extLst>
               <a:ext uri="{FF2B5EF4-FFF2-40B4-BE49-F238E27FC236}">
-                <a16:creationId xmlns:a16="http://schemas.microsoft.com/office/drawing/2014/main" id="{DEAD13D1-8921-41EB-9EDF-DA3F5121F449}"/>
+                <a16:creationId xmlns:a16="http://schemas.microsoft.com/office/drawing/2014/main" xmlns="" id="{DEAD13D1-8921-41EB-9EDF-DA3F5121F449}"/>
               </a:ext>
             </a:extLst>
           </p:cNvPr>
@@ -4921,7 +4921,7 @@
           <p:cNvPr id="19" name="Rectangle 18">
             <a:extLst>
               <a:ext uri="{FF2B5EF4-FFF2-40B4-BE49-F238E27FC236}">
-                <a16:creationId xmlns:a16="http://schemas.microsoft.com/office/drawing/2014/main" id="{7CFDBB16-985C-4CC7-B6DB-B81B36037922}"/>
+                <a16:creationId xmlns:a16="http://schemas.microsoft.com/office/drawing/2014/main" xmlns="" id="{7CFDBB16-985C-4CC7-B6DB-B81B36037922}"/>
               </a:ext>
             </a:extLst>
           </p:cNvPr>
@@ -5020,7 +5020,7 @@
           <p:cNvPr id="26" name="Picture 25">
             <a:extLst>
               <a:ext uri="{FF2B5EF4-FFF2-40B4-BE49-F238E27FC236}">
-                <a16:creationId xmlns:a16="http://schemas.microsoft.com/office/drawing/2014/main" id="{247CFF3C-C4FA-493D-8505-DF469F4D36A4}"/>
+                <a16:creationId xmlns:a16="http://schemas.microsoft.com/office/drawing/2014/main" xmlns="" id="{247CFF3C-C4FA-493D-8505-DF469F4D36A4}"/>
               </a:ext>
             </a:extLst>
           </p:cNvPr>
@@ -5056,7 +5056,7 @@
           <p:cNvPr id="42" name="Picture 41">
             <a:extLst>
               <a:ext uri="{FF2B5EF4-FFF2-40B4-BE49-F238E27FC236}">
-                <a16:creationId xmlns:a16="http://schemas.microsoft.com/office/drawing/2014/main" id="{320846EB-6FC8-4F9D-97D0-A1A8E9CEE0DE}"/>
+                <a16:creationId xmlns:a16="http://schemas.microsoft.com/office/drawing/2014/main" xmlns="" id="{320846EB-6FC8-4F9D-97D0-A1A8E9CEE0DE}"/>
               </a:ext>
             </a:extLst>
           </p:cNvPr>
@@ -5092,7 +5092,7 @@
           <p:cNvPr id="18" name="Picture 17">
             <a:extLst>
               <a:ext uri="{FF2B5EF4-FFF2-40B4-BE49-F238E27FC236}">
-                <a16:creationId xmlns:a16="http://schemas.microsoft.com/office/drawing/2014/main" id="{A0675455-B7FA-4569-A5FD-A3B0F20B2A26}"/>
+                <a16:creationId xmlns:a16="http://schemas.microsoft.com/office/drawing/2014/main" xmlns="" id="{A0675455-B7FA-4569-A5FD-A3B0F20B2A26}"/>
               </a:ext>
             </a:extLst>
           </p:cNvPr>
@@ -5128,7 +5128,7 @@
           <p:cNvPr id="20" name="Picture 19">
             <a:extLst>
               <a:ext uri="{FF2B5EF4-FFF2-40B4-BE49-F238E27FC236}">
-                <a16:creationId xmlns:a16="http://schemas.microsoft.com/office/drawing/2014/main" id="{827D15FD-4C66-4B85-98E6-7826AA8F61C6}"/>
+                <a16:creationId xmlns:a16="http://schemas.microsoft.com/office/drawing/2014/main" xmlns="" id="{827D15FD-4C66-4B85-98E6-7826AA8F61C6}"/>
               </a:ext>
             </a:extLst>
           </p:cNvPr>
@@ -5164,7 +5164,7 @@
           <p:cNvPr id="21" name="Picture 20">
             <a:extLst>
               <a:ext uri="{FF2B5EF4-FFF2-40B4-BE49-F238E27FC236}">
-                <a16:creationId xmlns:a16="http://schemas.microsoft.com/office/drawing/2014/main" id="{EA755AAE-BA08-481C-9224-0061170EE4B8}"/>
+                <a16:creationId xmlns:a16="http://schemas.microsoft.com/office/drawing/2014/main" xmlns="" id="{EA755AAE-BA08-481C-9224-0061170EE4B8}"/>
               </a:ext>
             </a:extLst>
           </p:cNvPr>
@@ -5200,7 +5200,7 @@
           <p:cNvPr id="22" name="Picture 21">
             <a:extLst>
               <a:ext uri="{FF2B5EF4-FFF2-40B4-BE49-F238E27FC236}">
-                <a16:creationId xmlns:a16="http://schemas.microsoft.com/office/drawing/2014/main" id="{0A83D66F-855B-463B-920B-BF239B01A206}"/>
+                <a16:creationId xmlns:a16="http://schemas.microsoft.com/office/drawing/2014/main" xmlns="" id="{0A83D66F-855B-463B-920B-BF239B01A206}"/>
               </a:ext>
             </a:extLst>
           </p:cNvPr>
@@ -5236,7 +5236,7 @@
           <p:cNvPr id="23" name="Picture 22">
             <a:extLst>
               <a:ext uri="{FF2B5EF4-FFF2-40B4-BE49-F238E27FC236}">
-                <a16:creationId xmlns:a16="http://schemas.microsoft.com/office/drawing/2014/main" id="{6643F71A-2013-433A-8322-FBAAED3162D8}"/>
+                <a16:creationId xmlns:a16="http://schemas.microsoft.com/office/drawing/2014/main" xmlns="" id="{6643F71A-2013-433A-8322-FBAAED3162D8}"/>
               </a:ext>
             </a:extLst>
           </p:cNvPr>
@@ -5272,7 +5272,7 @@
           <p:cNvPr id="24" name="Picture 23">
             <a:extLst>
               <a:ext uri="{FF2B5EF4-FFF2-40B4-BE49-F238E27FC236}">
-                <a16:creationId xmlns:a16="http://schemas.microsoft.com/office/drawing/2014/main" id="{B0812936-74B6-4265-8C08-AEDC8C798702}"/>
+                <a16:creationId xmlns:a16="http://schemas.microsoft.com/office/drawing/2014/main" xmlns="" id="{B0812936-74B6-4265-8C08-AEDC8C798702}"/>
               </a:ext>
             </a:extLst>
           </p:cNvPr>
@@ -5308,7 +5308,7 @@
           <p:cNvPr id="25" name="Picture 24">
             <a:extLst>
               <a:ext uri="{FF2B5EF4-FFF2-40B4-BE49-F238E27FC236}">
-                <a16:creationId xmlns:a16="http://schemas.microsoft.com/office/drawing/2014/main" id="{C74C190C-5856-41B9-8819-AE8DE0E10980}"/>
+                <a16:creationId xmlns:a16="http://schemas.microsoft.com/office/drawing/2014/main" xmlns="" id="{C74C190C-5856-41B9-8819-AE8DE0E10980}"/>
               </a:ext>
             </a:extLst>
           </p:cNvPr>
@@ -5344,7 +5344,7 @@
           <p:cNvPr id="27" name="Straight Connector 26">
             <a:extLst>
               <a:ext uri="{FF2B5EF4-FFF2-40B4-BE49-F238E27FC236}">
-                <a16:creationId xmlns:a16="http://schemas.microsoft.com/office/drawing/2014/main" id="{5F62FB7C-BD6E-4383-98C1-2CF30F34CAFD}"/>
+                <a16:creationId xmlns:a16="http://schemas.microsoft.com/office/drawing/2014/main" xmlns="" id="{5F62FB7C-BD6E-4383-98C1-2CF30F34CAFD}"/>
               </a:ext>
             </a:extLst>
           </p:cNvPr>
@@ -5383,7 +5383,7 @@
           <p:cNvPr id="28" name="Straight Connector 27">
             <a:extLst>
               <a:ext uri="{FF2B5EF4-FFF2-40B4-BE49-F238E27FC236}">
-                <a16:creationId xmlns:a16="http://schemas.microsoft.com/office/drawing/2014/main" id="{D4E5982E-3110-47E1-A5BB-91B7BECC3093}"/>
+                <a16:creationId xmlns:a16="http://schemas.microsoft.com/office/drawing/2014/main" xmlns="" id="{D4E5982E-3110-47E1-A5BB-91B7BECC3093}"/>
               </a:ext>
             </a:extLst>
           </p:cNvPr>
@@ -5420,7 +5420,7 @@
           <p:cNvPr id="29" name="Straight Connector 28">
             <a:extLst>
               <a:ext uri="{FF2B5EF4-FFF2-40B4-BE49-F238E27FC236}">
-                <a16:creationId xmlns:a16="http://schemas.microsoft.com/office/drawing/2014/main" id="{72BFE2F3-0845-4E5B-9375-E9D4027DD675}"/>
+                <a16:creationId xmlns:a16="http://schemas.microsoft.com/office/drawing/2014/main" xmlns="" id="{72BFE2F3-0845-4E5B-9375-E9D4027DD675}"/>
               </a:ext>
             </a:extLst>
           </p:cNvPr>
@@ -5457,7 +5457,7 @@
           <p:cNvPr id="30" name="Straight Connector 29">
             <a:extLst>
               <a:ext uri="{FF2B5EF4-FFF2-40B4-BE49-F238E27FC236}">
-                <a16:creationId xmlns:a16="http://schemas.microsoft.com/office/drawing/2014/main" id="{93DDBF37-0764-47AA-94E3-9A44F3ED8FB5}"/>
+                <a16:creationId xmlns:a16="http://schemas.microsoft.com/office/drawing/2014/main" xmlns="" id="{93DDBF37-0764-47AA-94E3-9A44F3ED8FB5}"/>
               </a:ext>
             </a:extLst>
           </p:cNvPr>
@@ -5494,7 +5494,7 @@
           <p:cNvPr id="31" name="Straight Connector 30">
             <a:extLst>
               <a:ext uri="{FF2B5EF4-FFF2-40B4-BE49-F238E27FC236}">
-                <a16:creationId xmlns:a16="http://schemas.microsoft.com/office/drawing/2014/main" id="{299ABE09-E33C-46B7-A80D-7BF4A6956211}"/>
+                <a16:creationId xmlns:a16="http://schemas.microsoft.com/office/drawing/2014/main" xmlns="" id="{299ABE09-E33C-46B7-A80D-7BF4A6956211}"/>
               </a:ext>
             </a:extLst>
           </p:cNvPr>
@@ -5531,7 +5531,7 @@
           <p:cNvPr id="32" name="Straight Connector 31">
             <a:extLst>
               <a:ext uri="{FF2B5EF4-FFF2-40B4-BE49-F238E27FC236}">
-                <a16:creationId xmlns:a16="http://schemas.microsoft.com/office/drawing/2014/main" id="{6E91D320-3732-40B8-864D-142D0A277ED1}"/>
+                <a16:creationId xmlns:a16="http://schemas.microsoft.com/office/drawing/2014/main" xmlns="" id="{6E91D320-3732-40B8-864D-142D0A277ED1}"/>
               </a:ext>
             </a:extLst>
           </p:cNvPr>
@@ -5570,7 +5570,7 @@
           <p:cNvPr id="33" name="Straight Connector 32">
             <a:extLst>
               <a:ext uri="{FF2B5EF4-FFF2-40B4-BE49-F238E27FC236}">
-                <a16:creationId xmlns:a16="http://schemas.microsoft.com/office/drawing/2014/main" id="{5C63D1E8-4A92-4691-8A24-A2FC7E8008E5}"/>
+                <a16:creationId xmlns:a16="http://schemas.microsoft.com/office/drawing/2014/main" xmlns="" id="{5C63D1E8-4A92-4691-8A24-A2FC7E8008E5}"/>
               </a:ext>
             </a:extLst>
           </p:cNvPr>
@@ -5609,7 +5609,7 @@
           <p:cNvPr id="34" name="Straight Connector 33">
             <a:extLst>
               <a:ext uri="{FF2B5EF4-FFF2-40B4-BE49-F238E27FC236}">
-                <a16:creationId xmlns:a16="http://schemas.microsoft.com/office/drawing/2014/main" id="{C84A0FE1-723D-4682-8682-77BAD950EE15}"/>
+                <a16:creationId xmlns:a16="http://schemas.microsoft.com/office/drawing/2014/main" xmlns="" id="{C84A0FE1-723D-4682-8682-77BAD950EE15}"/>
               </a:ext>
             </a:extLst>
           </p:cNvPr>
@@ -5646,7 +5646,7 @@
           <p:cNvPr id="35" name="Rectangle 34">
             <a:extLst>
               <a:ext uri="{FF2B5EF4-FFF2-40B4-BE49-F238E27FC236}">
-                <a16:creationId xmlns:a16="http://schemas.microsoft.com/office/drawing/2014/main" id="{550A59F9-9A9D-4956-95B4-F78CC0DB1D59}"/>
+                <a16:creationId xmlns:a16="http://schemas.microsoft.com/office/drawing/2014/main" xmlns="" id="{550A59F9-9A9D-4956-95B4-F78CC0DB1D59}"/>
               </a:ext>
             </a:extLst>
           </p:cNvPr>
@@ -5727,7 +5727,7 @@
           <p:cNvPr id="3" name="Date Placeholder 2">
             <a:extLst>
               <a:ext uri="{FF2B5EF4-FFF2-40B4-BE49-F238E27FC236}">
-                <a16:creationId xmlns:a16="http://schemas.microsoft.com/office/drawing/2014/main" id="{A0C5090E-6CF8-44E5-B9E1-699141F0FFCC}"/>
+                <a16:creationId xmlns:a16="http://schemas.microsoft.com/office/drawing/2014/main" xmlns="" id="{A0C5090E-6CF8-44E5-B9E1-699141F0FFCC}"/>
               </a:ext>
             </a:extLst>
           </p:cNvPr>
@@ -5746,7 +5746,7 @@
             <a:fld id="{055373AC-9AA7-423B-BA00-BA1C74164DBD}" type="datetime1">
               <a:rPr lang="en-US" smtClean="0"/>
               <a:pPr/>
-              <a:t>10/21/2019</a:t>
+              <a:t>11/5/2019</a:t>
             </a:fld>
             <a:endParaRPr lang="en-US" dirty="0"/>
           </a:p>
@@ -5757,7 +5757,7 @@
           <p:cNvPr id="4" name="Footer Placeholder 3">
             <a:extLst>
               <a:ext uri="{FF2B5EF4-FFF2-40B4-BE49-F238E27FC236}">
-                <a16:creationId xmlns:a16="http://schemas.microsoft.com/office/drawing/2014/main" id="{F9194957-EA63-44EA-BE91-D0BBA7D9252D}"/>
+                <a16:creationId xmlns:a16="http://schemas.microsoft.com/office/drawing/2014/main" xmlns="" id="{F9194957-EA63-44EA-BE91-D0BBA7D9252D}"/>
               </a:ext>
             </a:extLst>
           </p:cNvPr>
@@ -5782,7 +5782,7 @@
           <p:cNvPr id="5" name="Slide Number Placeholder 4">
             <a:extLst>
               <a:ext uri="{FF2B5EF4-FFF2-40B4-BE49-F238E27FC236}">
-                <a16:creationId xmlns:a16="http://schemas.microsoft.com/office/drawing/2014/main" id="{67D72737-4098-4B82-8447-1DD1996BC197}"/>
+                <a16:creationId xmlns:a16="http://schemas.microsoft.com/office/drawing/2014/main" xmlns="" id="{67D72737-4098-4B82-8447-1DD1996BC197}"/>
               </a:ext>
             </a:extLst>
           </p:cNvPr>
@@ -5828,7 +5828,7 @@
   <p:hf hdr="0" ftr="0" dt="0"/>
   <p:extLst mod="1">
     <p:ext uri="{DCECCB84-F9BA-43D5-87BE-67443E8EF086}">
-      <p15:sldGuideLst xmlns:p15="http://schemas.microsoft.com/office/powerpoint/2012/main">
+      <p15:sldGuideLst xmlns:p15="http://schemas.microsoft.com/office/powerpoint/2012/main" xmlns="">
         <p15:guide id="1" orient="horz" pos="2160">
           <p15:clr>
             <a:srgbClr val="FBAE40"/>
@@ -5867,7 +5867,7 @@
           <p:cNvPr id="8" name="Picture 7">
             <a:extLst>
               <a:ext uri="{FF2B5EF4-FFF2-40B4-BE49-F238E27FC236}">
-                <a16:creationId xmlns:a16="http://schemas.microsoft.com/office/drawing/2014/main" id="{21DA41A3-0295-46DF-A320-41070D15EA50}"/>
+                <a16:creationId xmlns:a16="http://schemas.microsoft.com/office/drawing/2014/main" xmlns="" id="{21DA41A3-0295-46DF-A320-41070D15EA50}"/>
               </a:ext>
             </a:extLst>
           </p:cNvPr>
@@ -5896,7 +5896,7 @@
           <p:cNvPr id="12" name="Content Placeholder 3">
             <a:extLst>
               <a:ext uri="{FF2B5EF4-FFF2-40B4-BE49-F238E27FC236}">
-                <a16:creationId xmlns:a16="http://schemas.microsoft.com/office/drawing/2014/main" id="{0C1F9416-8B6E-46DE-973C-777785E27A26}"/>
+                <a16:creationId xmlns:a16="http://schemas.microsoft.com/office/drawing/2014/main" xmlns="" id="{0C1F9416-8B6E-46DE-973C-777785E27A26}"/>
               </a:ext>
             </a:extLst>
           </p:cNvPr>
@@ -6122,7 +6122,7 @@
             <a:hlinkClick r:id="rId7" tooltip="Software University @ Facebook"/>
             <a:extLst>
               <a:ext uri="{FF2B5EF4-FFF2-40B4-BE49-F238E27FC236}">
-                <a16:creationId xmlns:a16="http://schemas.microsoft.com/office/drawing/2014/main" id="{0101C673-F197-4525-ADDC-FFD181E4E167}"/>
+                <a16:creationId xmlns:a16="http://schemas.microsoft.com/office/drawing/2014/main" xmlns="" id="{0101C673-F197-4525-ADDC-FFD181E4E167}"/>
               </a:ext>
             </a:extLst>
           </p:cNvPr>
@@ -6169,7 +6169,7 @@
             <a:hlinkClick r:id="rId6" tooltip="Software University Discussion Forum"/>
             <a:extLst>
               <a:ext uri="{FF2B5EF4-FFF2-40B4-BE49-F238E27FC236}">
-                <a16:creationId xmlns:a16="http://schemas.microsoft.com/office/drawing/2014/main" id="{A584039C-C3B0-4714-A6D0-181CA3D2DD26}"/>
+                <a16:creationId xmlns:a16="http://schemas.microsoft.com/office/drawing/2014/main" xmlns="" id="{A584039C-C3B0-4714-A6D0-181CA3D2DD26}"/>
               </a:ext>
             </a:extLst>
           </p:cNvPr>
@@ -6206,7 +6206,7 @@
             <a:hlinkClick r:id="rId3"/>
             <a:extLst>
               <a:ext uri="{FF2B5EF4-FFF2-40B4-BE49-F238E27FC236}">
-                <a16:creationId xmlns:a16="http://schemas.microsoft.com/office/drawing/2014/main" id="{07C965FA-A87E-4824-AFA8-C67AF548A76A}"/>
+                <a16:creationId xmlns:a16="http://schemas.microsoft.com/office/drawing/2014/main" xmlns="" id="{07C965FA-A87E-4824-AFA8-C67AF548A76A}"/>
               </a:ext>
             </a:extLst>
           </p:cNvPr>
@@ -6242,7 +6242,7 @@
           <p:cNvPr id="3" name="Picture 2">
             <a:extLst>
               <a:ext uri="{FF2B5EF4-FFF2-40B4-BE49-F238E27FC236}">
-                <a16:creationId xmlns:a16="http://schemas.microsoft.com/office/drawing/2014/main" id="{7DC5D9AB-27D1-4866-B85E-1728987FAEF5}"/>
+                <a16:creationId xmlns:a16="http://schemas.microsoft.com/office/drawing/2014/main" xmlns="" id="{7DC5D9AB-27D1-4866-B85E-1728987FAEF5}"/>
               </a:ext>
             </a:extLst>
           </p:cNvPr>
@@ -6278,7 +6278,7 @@
           <p:cNvPr id="10" name="Rectangle 9">
             <a:extLst>
               <a:ext uri="{FF2B5EF4-FFF2-40B4-BE49-F238E27FC236}">
-                <a16:creationId xmlns:a16="http://schemas.microsoft.com/office/drawing/2014/main" id="{86646B95-5E3B-4DE8-9118-031C2C296D8C}"/>
+                <a16:creationId xmlns:a16="http://schemas.microsoft.com/office/drawing/2014/main" xmlns="" id="{86646B95-5E3B-4DE8-9118-031C2C296D8C}"/>
               </a:ext>
             </a:extLst>
           </p:cNvPr>
@@ -6359,7 +6359,7 @@
           <p:cNvPr id="18" name="Title 17">
             <a:extLst>
               <a:ext uri="{FF2B5EF4-FFF2-40B4-BE49-F238E27FC236}">
-                <a16:creationId xmlns:a16="http://schemas.microsoft.com/office/drawing/2014/main" id="{AE87ED9C-76E1-4D85-9B06-3AF44AABB668}"/>
+                <a16:creationId xmlns:a16="http://schemas.microsoft.com/office/drawing/2014/main" xmlns="" id="{AE87ED9C-76E1-4D85-9B06-3AF44AABB668}"/>
               </a:ext>
             </a:extLst>
           </p:cNvPr>
@@ -6447,7 +6447,7 @@
           <p:cNvPr id="10" name="Picture 9">
             <a:extLst>
               <a:ext uri="{FF2B5EF4-FFF2-40B4-BE49-F238E27FC236}">
-                <a16:creationId xmlns:a16="http://schemas.microsoft.com/office/drawing/2014/main" id="{89AD94B5-9922-4E42-89CE-3C445EFB152E}"/>
+                <a16:creationId xmlns:a16="http://schemas.microsoft.com/office/drawing/2014/main" xmlns="" id="{89AD94B5-9922-4E42-89CE-3C445EFB152E}"/>
               </a:ext>
             </a:extLst>
           </p:cNvPr>
@@ -6476,7 +6476,7 @@
           <p:cNvPr id="13" name="Rectangle 12">
             <a:extLst>
               <a:ext uri="{FF2B5EF4-FFF2-40B4-BE49-F238E27FC236}">
-                <a16:creationId xmlns:a16="http://schemas.microsoft.com/office/drawing/2014/main" id="{391AFA4E-7870-4561-A1B8-AC956B0C8931}"/>
+                <a16:creationId xmlns:a16="http://schemas.microsoft.com/office/drawing/2014/main" xmlns="" id="{391AFA4E-7870-4561-A1B8-AC956B0C8931}"/>
               </a:ext>
             </a:extLst>
           </p:cNvPr>
@@ -6557,7 +6557,7 @@
           <p:cNvPr id="3" name="Text Placeholder 2">
             <a:extLst>
               <a:ext uri="{FF2B5EF4-FFF2-40B4-BE49-F238E27FC236}">
-                <a16:creationId xmlns:a16="http://schemas.microsoft.com/office/drawing/2014/main" id="{5A9D2960-6D42-439F-82E8-812822013A10}"/>
+                <a16:creationId xmlns:a16="http://schemas.microsoft.com/office/drawing/2014/main" xmlns="" id="{5A9D2960-6D42-439F-82E8-812822013A10}"/>
               </a:ext>
             </a:extLst>
           </p:cNvPr>
@@ -6620,7 +6620,7 @@
           <p:cNvPr id="6" name="Title 5">
             <a:extLst>
               <a:ext uri="{FF2B5EF4-FFF2-40B4-BE49-F238E27FC236}">
-                <a16:creationId xmlns:a16="http://schemas.microsoft.com/office/drawing/2014/main" id="{19B5B676-7892-440F-8191-7109B2C59885}"/>
+                <a16:creationId xmlns:a16="http://schemas.microsoft.com/office/drawing/2014/main" xmlns="" id="{19B5B676-7892-440F-8191-7109B2C59885}"/>
               </a:ext>
             </a:extLst>
           </p:cNvPr>
@@ -6656,7 +6656,7 @@
           <p:cNvPr id="2" name="Date Placeholder 1">
             <a:extLst>
               <a:ext uri="{FF2B5EF4-FFF2-40B4-BE49-F238E27FC236}">
-                <a16:creationId xmlns:a16="http://schemas.microsoft.com/office/drawing/2014/main" id="{303E2769-FF5C-435B-BEDD-ABA3B8F1B976}"/>
+                <a16:creationId xmlns:a16="http://schemas.microsoft.com/office/drawing/2014/main" xmlns="" id="{303E2769-FF5C-435B-BEDD-ABA3B8F1B976}"/>
               </a:ext>
             </a:extLst>
           </p:cNvPr>
@@ -6675,7 +6675,7 @@
             <a:fld id="{055373AC-9AA7-423B-BA00-BA1C74164DBD}" type="datetime1">
               <a:rPr lang="en-US" smtClean="0"/>
               <a:pPr/>
-              <a:t>10/21/2019</a:t>
+              <a:t>11/5/2019</a:t>
             </a:fld>
             <a:endParaRPr lang="en-US" dirty="0"/>
           </a:p>
@@ -6686,7 +6686,7 @@
           <p:cNvPr id="4" name="Footer Placeholder 3">
             <a:extLst>
               <a:ext uri="{FF2B5EF4-FFF2-40B4-BE49-F238E27FC236}">
-                <a16:creationId xmlns:a16="http://schemas.microsoft.com/office/drawing/2014/main" id="{9CB6AD27-58D7-46FA-99F8-E5BB835ADA68}"/>
+                <a16:creationId xmlns:a16="http://schemas.microsoft.com/office/drawing/2014/main" xmlns="" id="{9CB6AD27-58D7-46FA-99F8-E5BB835ADA68}"/>
               </a:ext>
             </a:extLst>
           </p:cNvPr>
@@ -6711,7 +6711,7 @@
           <p:cNvPr id="5" name="Slide Number Placeholder 4">
             <a:extLst>
               <a:ext uri="{FF2B5EF4-FFF2-40B4-BE49-F238E27FC236}">
-                <a16:creationId xmlns:a16="http://schemas.microsoft.com/office/drawing/2014/main" id="{389DA7C9-2FCE-40EB-BF32-C6983222020F}"/>
+                <a16:creationId xmlns:a16="http://schemas.microsoft.com/office/drawing/2014/main" xmlns="" id="{389DA7C9-2FCE-40EB-BF32-C6983222020F}"/>
               </a:ext>
             </a:extLst>
           </p:cNvPr>
@@ -6741,7 +6741,7 @@
           <p:cNvPr id="11" name="Picture 10">
             <a:extLst>
               <a:ext uri="{FF2B5EF4-FFF2-40B4-BE49-F238E27FC236}">
-                <a16:creationId xmlns:a16="http://schemas.microsoft.com/office/drawing/2014/main" id="{0991B60F-461F-45D1-A35C-8AC3D83E7AD8}"/>
+                <a16:creationId xmlns:a16="http://schemas.microsoft.com/office/drawing/2014/main" xmlns="" id="{0991B60F-461F-45D1-A35C-8AC3D83E7AD8}"/>
               </a:ext>
             </a:extLst>
           </p:cNvPr>
@@ -6861,7 +6861,7 @@
             <a:fld id="{055373AC-9AA7-423B-BA00-BA1C74164DBD}" type="datetime1">
               <a:rPr lang="en-US" smtClean="0"/>
               <a:pPr/>
-              <a:t>10/21/2019</a:t>
+              <a:t>11/5/2019</a:t>
             </a:fld>
             <a:endParaRPr lang="en-US" dirty="0"/>
           </a:p>
@@ -7073,7 +7073,7 @@
           <p:cNvPr id="8" name="Picture 7">
             <a:extLst>
               <a:ext uri="{FF2B5EF4-FFF2-40B4-BE49-F238E27FC236}">
-                <a16:creationId xmlns:a16="http://schemas.microsoft.com/office/drawing/2014/main" id="{3F2F5D5A-DC69-433E-A632-9FB51F8BCC0F}"/>
+                <a16:creationId xmlns:a16="http://schemas.microsoft.com/office/drawing/2014/main" xmlns="" id="{3F2F5D5A-DC69-433E-A632-9FB51F8BCC0F}"/>
               </a:ext>
             </a:extLst>
           </p:cNvPr>
@@ -7139,7 +7139,7 @@
           <p:cNvPr id="11" name="Picture 10">
             <a:extLst>
               <a:ext uri="{FF2B5EF4-FFF2-40B4-BE49-F238E27FC236}">
-                <a16:creationId xmlns:a16="http://schemas.microsoft.com/office/drawing/2014/main" id="{C1E40596-5F7F-41C3-9807-7FA635B42492}"/>
+                <a16:creationId xmlns:a16="http://schemas.microsoft.com/office/drawing/2014/main" xmlns="" id="{C1E40596-5F7F-41C3-9807-7FA635B42492}"/>
               </a:ext>
             </a:extLst>
           </p:cNvPr>
@@ -7168,7 +7168,7 @@
           <p:cNvPr id="7" name="Rectangle 6">
             <a:extLst>
               <a:ext uri="{FF2B5EF4-FFF2-40B4-BE49-F238E27FC236}">
-                <a16:creationId xmlns:a16="http://schemas.microsoft.com/office/drawing/2014/main" id="{C5951C9B-3DEE-4E28-8D4C-55505E0CB6AB}"/>
+                <a16:creationId xmlns:a16="http://schemas.microsoft.com/office/drawing/2014/main" xmlns="" id="{C5951C9B-3DEE-4E28-8D4C-55505E0CB6AB}"/>
               </a:ext>
             </a:extLst>
           </p:cNvPr>
@@ -7249,7 +7249,7 @@
           <p:cNvPr id="9" name="Picture 8" descr="A drawing of a cartoon character&#10;&#10;Description generated with high confidence">
             <a:extLst>
               <a:ext uri="{FF2B5EF4-FFF2-40B4-BE49-F238E27FC236}">
-                <a16:creationId xmlns:a16="http://schemas.microsoft.com/office/drawing/2014/main" id="{DC4365F6-D2C1-47B4-8477-38FD2C7711AA}"/>
+                <a16:creationId xmlns:a16="http://schemas.microsoft.com/office/drawing/2014/main" xmlns="" id="{DC4365F6-D2C1-47B4-8477-38FD2C7711AA}"/>
               </a:ext>
             </a:extLst>
           </p:cNvPr>
@@ -7285,7 +7285,7 @@
           <p:cNvPr id="12" name="Title 11">
             <a:extLst>
               <a:ext uri="{FF2B5EF4-FFF2-40B4-BE49-F238E27FC236}">
-                <a16:creationId xmlns:a16="http://schemas.microsoft.com/office/drawing/2014/main" id="{48CCE616-2FC8-4941-8612-3EC8CFD842E0}"/>
+                <a16:creationId xmlns:a16="http://schemas.microsoft.com/office/drawing/2014/main" xmlns="" id="{48CCE616-2FC8-4941-8612-3EC8CFD842E0}"/>
               </a:ext>
             </a:extLst>
           </p:cNvPr>
@@ -7321,7 +7321,7 @@
           <p:cNvPr id="23" name="Text Placeholder 22">
             <a:extLst>
               <a:ext uri="{FF2B5EF4-FFF2-40B4-BE49-F238E27FC236}">
-                <a16:creationId xmlns:a16="http://schemas.microsoft.com/office/drawing/2014/main" id="{889D93F4-ABFA-46BF-8E5D-FE6562ACB20F}"/>
+                <a16:creationId xmlns:a16="http://schemas.microsoft.com/office/drawing/2014/main" xmlns="" id="{889D93F4-ABFA-46BF-8E5D-FE6562ACB20F}"/>
               </a:ext>
             </a:extLst>
           </p:cNvPr>
@@ -7380,7 +7380,7 @@
           <p:cNvPr id="10" name="Picture 9">
             <a:extLst>
               <a:ext uri="{FF2B5EF4-FFF2-40B4-BE49-F238E27FC236}">
-                <a16:creationId xmlns:a16="http://schemas.microsoft.com/office/drawing/2014/main" id="{DF7D6D63-C0D2-4213-B1FA-96890BDE6C03}"/>
+                <a16:creationId xmlns:a16="http://schemas.microsoft.com/office/drawing/2014/main" xmlns="" id="{DF7D6D63-C0D2-4213-B1FA-96890BDE6C03}"/>
               </a:ext>
             </a:extLst>
           </p:cNvPr>
@@ -7416,7 +7416,7 @@
           <p:cNvPr id="14" name="Date Placeholder 13">
             <a:extLst>
               <a:ext uri="{FF2B5EF4-FFF2-40B4-BE49-F238E27FC236}">
-                <a16:creationId xmlns:a16="http://schemas.microsoft.com/office/drawing/2014/main" id="{0AA6AF62-9F6D-4B1C-831C-72AACA29F786}"/>
+                <a16:creationId xmlns:a16="http://schemas.microsoft.com/office/drawing/2014/main" xmlns="" id="{0AA6AF62-9F6D-4B1C-831C-72AACA29F786}"/>
               </a:ext>
             </a:extLst>
           </p:cNvPr>
@@ -7435,7 +7435,7 @@
             <a:fld id="{055373AC-9AA7-423B-BA00-BA1C74164DBD}" type="datetime1">
               <a:rPr lang="en-US" smtClean="0"/>
               <a:pPr/>
-              <a:t>10/21/2019</a:t>
+              <a:t>11/5/2019</a:t>
             </a:fld>
             <a:endParaRPr lang="en-US" dirty="0"/>
           </a:p>
@@ -7446,7 +7446,7 @@
           <p:cNvPr id="15" name="Footer Placeholder 14">
             <a:extLst>
               <a:ext uri="{FF2B5EF4-FFF2-40B4-BE49-F238E27FC236}">
-                <a16:creationId xmlns:a16="http://schemas.microsoft.com/office/drawing/2014/main" id="{D92A8ED8-1E91-4F87-9AAB-0B939CA64F66}"/>
+                <a16:creationId xmlns:a16="http://schemas.microsoft.com/office/drawing/2014/main" xmlns="" id="{D92A8ED8-1E91-4F87-9AAB-0B939CA64F66}"/>
               </a:ext>
             </a:extLst>
           </p:cNvPr>
@@ -7471,7 +7471,7 @@
           <p:cNvPr id="16" name="Slide Number Placeholder 15">
             <a:extLst>
               <a:ext uri="{FF2B5EF4-FFF2-40B4-BE49-F238E27FC236}">
-                <a16:creationId xmlns:a16="http://schemas.microsoft.com/office/drawing/2014/main" id="{37E4C518-B0B3-4716-AB97-AC8ECA4F7C84}"/>
+                <a16:creationId xmlns:a16="http://schemas.microsoft.com/office/drawing/2014/main" xmlns="" id="{37E4C518-B0B3-4716-AB97-AC8ECA4F7C84}"/>
               </a:ext>
             </a:extLst>
           </p:cNvPr>
@@ -7540,7 +7540,7 @@
           <p:cNvPr id="6" name="Picture 5">
             <a:extLst>
               <a:ext uri="{FF2B5EF4-FFF2-40B4-BE49-F238E27FC236}">
-                <a16:creationId xmlns:a16="http://schemas.microsoft.com/office/drawing/2014/main" id="{455D431A-1BDA-40DB-B7D8-23653331B7C3}"/>
+                <a16:creationId xmlns:a16="http://schemas.microsoft.com/office/drawing/2014/main" xmlns="" id="{455D431A-1BDA-40DB-B7D8-23653331B7C3}"/>
               </a:ext>
             </a:extLst>
           </p:cNvPr>
@@ -7774,7 +7774,7 @@
           <p:cNvPr id="16" name="Picture 15">
             <a:extLst>
               <a:ext uri="{FF2B5EF4-FFF2-40B4-BE49-F238E27FC236}">
-                <a16:creationId xmlns:a16="http://schemas.microsoft.com/office/drawing/2014/main" id="{B0FF4B1E-24EA-407C-BFA6-24CCB6D4409A}"/>
+                <a16:creationId xmlns:a16="http://schemas.microsoft.com/office/drawing/2014/main" xmlns="" id="{B0FF4B1E-24EA-407C-BFA6-24CCB6D4409A}"/>
               </a:ext>
             </a:extLst>
           </p:cNvPr>
@@ -7958,7 +7958,7 @@
           <p:cNvPr id="7" name="Text Placeholder 6">
             <a:extLst>
               <a:ext uri="{FF2B5EF4-FFF2-40B4-BE49-F238E27FC236}">
-                <a16:creationId xmlns:a16="http://schemas.microsoft.com/office/drawing/2014/main" id="{CB4CB13C-66A1-466B-A6C1-B0BABF5CFEC1}"/>
+                <a16:creationId xmlns:a16="http://schemas.microsoft.com/office/drawing/2014/main" xmlns="" id="{CB4CB13C-66A1-466B-A6C1-B0BABF5CFEC1}"/>
               </a:ext>
             </a:extLst>
           </p:cNvPr>
@@ -8057,7 +8057,7 @@
           <p:cNvPr id="12" name="Title 11">
             <a:extLst>
               <a:ext uri="{FF2B5EF4-FFF2-40B4-BE49-F238E27FC236}">
-                <a16:creationId xmlns:a16="http://schemas.microsoft.com/office/drawing/2014/main" id="{4ED30444-7448-455E-ACFD-2D8F93C93971}"/>
+                <a16:creationId xmlns:a16="http://schemas.microsoft.com/office/drawing/2014/main" xmlns="" id="{4ED30444-7448-455E-ACFD-2D8F93C93971}"/>
               </a:ext>
             </a:extLst>
           </p:cNvPr>
@@ -8094,7 +8094,7 @@
           <p:cNvPr id="15" name="Picture 14">
             <a:extLst>
               <a:ext uri="{FF2B5EF4-FFF2-40B4-BE49-F238E27FC236}">
-                <a16:creationId xmlns:a16="http://schemas.microsoft.com/office/drawing/2014/main" id="{00505D47-5EAF-4709-A366-B1437B044AC8}"/>
+                <a16:creationId xmlns:a16="http://schemas.microsoft.com/office/drawing/2014/main" xmlns="" id="{00505D47-5EAF-4709-A366-B1437B044AC8}"/>
               </a:ext>
             </a:extLst>
           </p:cNvPr>
@@ -8130,7 +8130,7 @@
           <p:cNvPr id="8" name="Date Placeholder 7">
             <a:extLst>
               <a:ext uri="{FF2B5EF4-FFF2-40B4-BE49-F238E27FC236}">
-                <a16:creationId xmlns:a16="http://schemas.microsoft.com/office/drawing/2014/main" id="{CF9A2DC4-5280-4E93-B6D2-9709FE6D0627}"/>
+                <a16:creationId xmlns:a16="http://schemas.microsoft.com/office/drawing/2014/main" xmlns="" id="{CF9A2DC4-5280-4E93-B6D2-9709FE6D0627}"/>
               </a:ext>
             </a:extLst>
           </p:cNvPr>
@@ -8149,7 +8149,7 @@
             <a:fld id="{055373AC-9AA7-423B-BA00-BA1C74164DBD}" type="datetime1">
               <a:rPr lang="en-US" smtClean="0"/>
               <a:pPr/>
-              <a:t>10/21/2019</a:t>
+              <a:t>11/5/2019</a:t>
             </a:fld>
             <a:endParaRPr lang="en-US" dirty="0"/>
           </a:p>
@@ -8160,7 +8160,7 @@
           <p:cNvPr id="10" name="Footer Placeholder 9">
             <a:extLst>
               <a:ext uri="{FF2B5EF4-FFF2-40B4-BE49-F238E27FC236}">
-                <a16:creationId xmlns:a16="http://schemas.microsoft.com/office/drawing/2014/main" id="{FA4C1EE0-8040-49CB-9319-CF991DE7B325}"/>
+                <a16:creationId xmlns:a16="http://schemas.microsoft.com/office/drawing/2014/main" xmlns="" id="{FA4C1EE0-8040-49CB-9319-CF991DE7B325}"/>
               </a:ext>
             </a:extLst>
           </p:cNvPr>
@@ -8185,7 +8185,7 @@
           <p:cNvPr id="17" name="Slide Number Placeholder 16">
             <a:extLst>
               <a:ext uri="{FF2B5EF4-FFF2-40B4-BE49-F238E27FC236}">
-                <a16:creationId xmlns:a16="http://schemas.microsoft.com/office/drawing/2014/main" id="{1643825A-6B67-4224-B077-B526FC2A4C74}"/>
+                <a16:creationId xmlns:a16="http://schemas.microsoft.com/office/drawing/2014/main" xmlns="" id="{1643825A-6B67-4224-B077-B526FC2A4C74}"/>
               </a:ext>
             </a:extLst>
           </p:cNvPr>
@@ -8254,7 +8254,7 @@
           <p:cNvPr id="17" name="Picture 16">
             <a:extLst>
               <a:ext uri="{FF2B5EF4-FFF2-40B4-BE49-F238E27FC236}">
-                <a16:creationId xmlns:a16="http://schemas.microsoft.com/office/drawing/2014/main" id="{3DA6B0AA-1988-451B-88D4-0F726295570B}"/>
+                <a16:creationId xmlns:a16="http://schemas.microsoft.com/office/drawing/2014/main" xmlns="" id="{3DA6B0AA-1988-451B-88D4-0F726295570B}"/>
               </a:ext>
             </a:extLst>
           </p:cNvPr>
@@ -8283,7 +8283,7 @@
           <p:cNvPr id="12" name="Rectangle 11">
             <a:extLst>
               <a:ext uri="{FF2B5EF4-FFF2-40B4-BE49-F238E27FC236}">
-                <a16:creationId xmlns:a16="http://schemas.microsoft.com/office/drawing/2014/main" id="{345FB1C8-7F66-4D5C-ACCE-AE919936BCFD}"/>
+                <a16:creationId xmlns:a16="http://schemas.microsoft.com/office/drawing/2014/main" xmlns="" id="{345FB1C8-7F66-4D5C-ACCE-AE919936BCFD}"/>
               </a:ext>
             </a:extLst>
           </p:cNvPr>
@@ -8405,7 +8405,7 @@
           <p:cNvPr id="13" name="Title 11">
             <a:extLst>
               <a:ext uri="{FF2B5EF4-FFF2-40B4-BE49-F238E27FC236}">
-                <a16:creationId xmlns:a16="http://schemas.microsoft.com/office/drawing/2014/main" id="{0D5CC956-5C4A-44BE-8F8B-327FAFA51E97}"/>
+                <a16:creationId xmlns:a16="http://schemas.microsoft.com/office/drawing/2014/main" xmlns="" id="{0D5CC956-5C4A-44BE-8F8B-327FAFA51E97}"/>
               </a:ext>
             </a:extLst>
           </p:cNvPr>
@@ -8442,7 +8442,7 @@
           <p:cNvPr id="15" name="Text Placeholder 6">
             <a:extLst>
               <a:ext uri="{FF2B5EF4-FFF2-40B4-BE49-F238E27FC236}">
-                <a16:creationId xmlns:a16="http://schemas.microsoft.com/office/drawing/2014/main" id="{6157C8DE-E0AF-422B-BBB1-F0AF1264B5E9}"/>
+                <a16:creationId xmlns:a16="http://schemas.microsoft.com/office/drawing/2014/main" xmlns="" id="{6157C8DE-E0AF-422B-BBB1-F0AF1264B5E9}"/>
               </a:ext>
             </a:extLst>
           </p:cNvPr>
@@ -8541,7 +8541,7 @@
           <p:cNvPr id="2" name="Date Placeholder 1">
             <a:extLst>
               <a:ext uri="{FF2B5EF4-FFF2-40B4-BE49-F238E27FC236}">
-                <a16:creationId xmlns:a16="http://schemas.microsoft.com/office/drawing/2014/main" id="{3FF2A4EF-FDC7-4D65-91A0-D3473057251B}"/>
+                <a16:creationId xmlns:a16="http://schemas.microsoft.com/office/drawing/2014/main" xmlns="" id="{3FF2A4EF-FDC7-4D65-91A0-D3473057251B}"/>
               </a:ext>
             </a:extLst>
           </p:cNvPr>
@@ -8560,7 +8560,7 @@
             <a:fld id="{055373AC-9AA7-423B-BA00-BA1C74164DBD}" type="datetime1">
               <a:rPr lang="en-US" smtClean="0"/>
               <a:pPr/>
-              <a:t>10/21/2019</a:t>
+              <a:t>11/5/2019</a:t>
             </a:fld>
             <a:endParaRPr lang="en-US" dirty="0"/>
           </a:p>
@@ -8571,7 +8571,7 @@
           <p:cNvPr id="3" name="Footer Placeholder 2">
             <a:extLst>
               <a:ext uri="{FF2B5EF4-FFF2-40B4-BE49-F238E27FC236}">
-                <a16:creationId xmlns:a16="http://schemas.microsoft.com/office/drawing/2014/main" id="{2AD0B15D-022F-4B93-A0E6-6FC062C18AF1}"/>
+                <a16:creationId xmlns:a16="http://schemas.microsoft.com/office/drawing/2014/main" xmlns="" id="{2AD0B15D-022F-4B93-A0E6-6FC062C18AF1}"/>
               </a:ext>
             </a:extLst>
           </p:cNvPr>
@@ -8596,7 +8596,7 @@
           <p:cNvPr id="4" name="Slide Number Placeholder 3">
             <a:extLst>
               <a:ext uri="{FF2B5EF4-FFF2-40B4-BE49-F238E27FC236}">
-                <a16:creationId xmlns:a16="http://schemas.microsoft.com/office/drawing/2014/main" id="{72845B5C-C9D2-4885-BBE1-AE0D4F570CBF}"/>
+                <a16:creationId xmlns:a16="http://schemas.microsoft.com/office/drawing/2014/main" xmlns="" id="{72845B5C-C9D2-4885-BBE1-AE0D4F570CBF}"/>
               </a:ext>
             </a:extLst>
           </p:cNvPr>
@@ -8626,7 +8626,7 @@
           <p:cNvPr id="11" name="Picture 10">
             <a:extLst>
               <a:ext uri="{FF2B5EF4-FFF2-40B4-BE49-F238E27FC236}">
-                <a16:creationId xmlns:a16="http://schemas.microsoft.com/office/drawing/2014/main" id="{A1E6AED5-8603-4881-90EA-963A2A5A2C03}"/>
+                <a16:creationId xmlns:a16="http://schemas.microsoft.com/office/drawing/2014/main" xmlns="" id="{A1E6AED5-8603-4881-90EA-963A2A5A2C03}"/>
               </a:ext>
             </a:extLst>
           </p:cNvPr>
@@ -8701,7 +8701,7 @@
           <p:cNvPr id="10" name="Picture 9">
             <a:extLst>
               <a:ext uri="{FF2B5EF4-FFF2-40B4-BE49-F238E27FC236}">
-                <a16:creationId xmlns:a16="http://schemas.microsoft.com/office/drawing/2014/main" id="{89AD94B5-9922-4E42-89CE-3C445EFB152E}"/>
+                <a16:creationId xmlns:a16="http://schemas.microsoft.com/office/drawing/2014/main" xmlns="" id="{89AD94B5-9922-4E42-89CE-3C445EFB152E}"/>
               </a:ext>
             </a:extLst>
           </p:cNvPr>
@@ -8730,7 +8730,7 @@
           <p:cNvPr id="13" name="Rectangle 12">
             <a:extLst>
               <a:ext uri="{FF2B5EF4-FFF2-40B4-BE49-F238E27FC236}">
-                <a16:creationId xmlns:a16="http://schemas.microsoft.com/office/drawing/2014/main" id="{391AFA4E-7870-4561-A1B8-AC956B0C8931}"/>
+                <a16:creationId xmlns:a16="http://schemas.microsoft.com/office/drawing/2014/main" xmlns="" id="{391AFA4E-7870-4561-A1B8-AC956B0C8931}"/>
               </a:ext>
             </a:extLst>
           </p:cNvPr>
@@ -8811,7 +8811,7 @@
           <p:cNvPr id="3" name="Text Placeholder 2">
             <a:extLst>
               <a:ext uri="{FF2B5EF4-FFF2-40B4-BE49-F238E27FC236}">
-                <a16:creationId xmlns:a16="http://schemas.microsoft.com/office/drawing/2014/main" id="{5A9D2960-6D42-439F-82E8-812822013A10}"/>
+                <a16:creationId xmlns:a16="http://schemas.microsoft.com/office/drawing/2014/main" xmlns="" id="{5A9D2960-6D42-439F-82E8-812822013A10}"/>
               </a:ext>
             </a:extLst>
           </p:cNvPr>
@@ -8874,7 +8874,7 @@
           <p:cNvPr id="6" name="Title 5">
             <a:extLst>
               <a:ext uri="{FF2B5EF4-FFF2-40B4-BE49-F238E27FC236}">
-                <a16:creationId xmlns:a16="http://schemas.microsoft.com/office/drawing/2014/main" id="{19B5B676-7892-440F-8191-7109B2C59885}"/>
+                <a16:creationId xmlns:a16="http://schemas.microsoft.com/office/drawing/2014/main" xmlns="" id="{19B5B676-7892-440F-8191-7109B2C59885}"/>
               </a:ext>
             </a:extLst>
           </p:cNvPr>
@@ -8910,7 +8910,7 @@
           <p:cNvPr id="2" name="Date Placeholder 1">
             <a:extLst>
               <a:ext uri="{FF2B5EF4-FFF2-40B4-BE49-F238E27FC236}">
-                <a16:creationId xmlns:a16="http://schemas.microsoft.com/office/drawing/2014/main" id="{303E2769-FF5C-435B-BEDD-ABA3B8F1B976}"/>
+                <a16:creationId xmlns:a16="http://schemas.microsoft.com/office/drawing/2014/main" xmlns="" id="{303E2769-FF5C-435B-BEDD-ABA3B8F1B976}"/>
               </a:ext>
             </a:extLst>
           </p:cNvPr>
@@ -8929,7 +8929,7 @@
             <a:fld id="{055373AC-9AA7-423B-BA00-BA1C74164DBD}" type="datetime1">
               <a:rPr lang="en-US" smtClean="0"/>
               <a:pPr/>
-              <a:t>10/21/2019</a:t>
+              <a:t>11/5/2019</a:t>
             </a:fld>
             <a:endParaRPr lang="en-US" dirty="0"/>
           </a:p>
@@ -8940,7 +8940,7 @@
           <p:cNvPr id="4" name="Footer Placeholder 3">
             <a:extLst>
               <a:ext uri="{FF2B5EF4-FFF2-40B4-BE49-F238E27FC236}">
-                <a16:creationId xmlns:a16="http://schemas.microsoft.com/office/drawing/2014/main" id="{9CB6AD27-58D7-46FA-99F8-E5BB835ADA68}"/>
+                <a16:creationId xmlns:a16="http://schemas.microsoft.com/office/drawing/2014/main" xmlns="" id="{9CB6AD27-58D7-46FA-99F8-E5BB835ADA68}"/>
               </a:ext>
             </a:extLst>
           </p:cNvPr>
@@ -8965,7 +8965,7 @@
           <p:cNvPr id="5" name="Slide Number Placeholder 4">
             <a:extLst>
               <a:ext uri="{FF2B5EF4-FFF2-40B4-BE49-F238E27FC236}">
-                <a16:creationId xmlns:a16="http://schemas.microsoft.com/office/drawing/2014/main" id="{389DA7C9-2FCE-40EB-BF32-C6983222020F}"/>
+                <a16:creationId xmlns:a16="http://schemas.microsoft.com/office/drawing/2014/main" xmlns="" id="{389DA7C9-2FCE-40EB-BF32-C6983222020F}"/>
               </a:ext>
             </a:extLst>
           </p:cNvPr>
@@ -8995,7 +8995,7 @@
           <p:cNvPr id="11" name="Picture 10">
             <a:extLst>
               <a:ext uri="{FF2B5EF4-FFF2-40B4-BE49-F238E27FC236}">
-                <a16:creationId xmlns:a16="http://schemas.microsoft.com/office/drawing/2014/main" id="{0991B60F-461F-45D1-A35C-8AC3D83E7AD8}"/>
+                <a16:creationId xmlns:a16="http://schemas.microsoft.com/office/drawing/2014/main" xmlns="" id="{0991B60F-461F-45D1-A35C-8AC3D83E7AD8}"/>
               </a:ext>
             </a:extLst>
           </p:cNvPr>
@@ -9108,7 +9108,7 @@
           <p:cNvPr id="14" name="Picture 13">
             <a:extLst>
               <a:ext uri="{FF2B5EF4-FFF2-40B4-BE49-F238E27FC236}">
-                <a16:creationId xmlns:a16="http://schemas.microsoft.com/office/drawing/2014/main" id="{79D60504-DA9E-4357-9A0A-15E333FC2783}"/>
+                <a16:creationId xmlns:a16="http://schemas.microsoft.com/office/drawing/2014/main" xmlns="" id="{79D60504-DA9E-4357-9A0A-15E333FC2783}"/>
               </a:ext>
             </a:extLst>
           </p:cNvPr>
@@ -9137,7 +9137,7 @@
           <p:cNvPr id="13" name="Rectangle 12">
             <a:extLst>
               <a:ext uri="{FF2B5EF4-FFF2-40B4-BE49-F238E27FC236}">
-                <a16:creationId xmlns:a16="http://schemas.microsoft.com/office/drawing/2014/main" id="{57B03959-5ED4-4593-8CEF-2AE1A73775F5}"/>
+                <a16:creationId xmlns:a16="http://schemas.microsoft.com/office/drawing/2014/main" xmlns="" id="{57B03959-5ED4-4593-8CEF-2AE1A73775F5}"/>
               </a:ext>
             </a:extLst>
           </p:cNvPr>
@@ -9375,7 +9375,7 @@
           <p:cNvPr id="6" name="Title 5">
             <a:extLst>
               <a:ext uri="{FF2B5EF4-FFF2-40B4-BE49-F238E27FC236}">
-                <a16:creationId xmlns:a16="http://schemas.microsoft.com/office/drawing/2014/main" id="{38A09987-8827-47B7-85D3-6D69487FC731}"/>
+                <a16:creationId xmlns:a16="http://schemas.microsoft.com/office/drawing/2014/main" xmlns="" id="{38A09987-8827-47B7-85D3-6D69487FC731}"/>
               </a:ext>
             </a:extLst>
           </p:cNvPr>
@@ -9411,7 +9411,7 @@
           <p:cNvPr id="12" name="Picture 11">
             <a:extLst>
               <a:ext uri="{FF2B5EF4-FFF2-40B4-BE49-F238E27FC236}">
-                <a16:creationId xmlns:a16="http://schemas.microsoft.com/office/drawing/2014/main" id="{7028D2F0-1E67-414B-A93D-D3F8F131A132}"/>
+                <a16:creationId xmlns:a16="http://schemas.microsoft.com/office/drawing/2014/main" xmlns="" id="{7028D2F0-1E67-414B-A93D-D3F8F131A132}"/>
               </a:ext>
             </a:extLst>
           </p:cNvPr>
@@ -9447,7 +9447,7 @@
           <p:cNvPr id="9" name="Text Placeholder 2">
             <a:extLst>
               <a:ext uri="{FF2B5EF4-FFF2-40B4-BE49-F238E27FC236}">
-                <a16:creationId xmlns:a16="http://schemas.microsoft.com/office/drawing/2014/main" id="{C8A626D2-456B-41EF-9818-EA8DD7E314DA}"/>
+                <a16:creationId xmlns:a16="http://schemas.microsoft.com/office/drawing/2014/main" xmlns="" id="{C8A626D2-456B-41EF-9818-EA8DD7E314DA}"/>
               </a:ext>
             </a:extLst>
           </p:cNvPr>
@@ -9510,7 +9510,7 @@
           <p:cNvPr id="10" name="Text Placeholder 2">
             <a:extLst>
               <a:ext uri="{FF2B5EF4-FFF2-40B4-BE49-F238E27FC236}">
-                <a16:creationId xmlns:a16="http://schemas.microsoft.com/office/drawing/2014/main" id="{AF69A59F-C564-4A04-B1CC-31C261499991}"/>
+                <a16:creationId xmlns:a16="http://schemas.microsoft.com/office/drawing/2014/main" xmlns="" id="{AF69A59F-C564-4A04-B1CC-31C261499991}"/>
               </a:ext>
             </a:extLst>
           </p:cNvPr>
@@ -9573,7 +9573,7 @@
           <p:cNvPr id="5" name="Date Placeholder 4">
             <a:extLst>
               <a:ext uri="{FF2B5EF4-FFF2-40B4-BE49-F238E27FC236}">
-                <a16:creationId xmlns:a16="http://schemas.microsoft.com/office/drawing/2014/main" id="{F858E34E-73A2-41B4-8C58-4DDB1D4D97D8}"/>
+                <a16:creationId xmlns:a16="http://schemas.microsoft.com/office/drawing/2014/main" xmlns="" id="{F858E34E-73A2-41B4-8C58-4DDB1D4D97D8}"/>
               </a:ext>
             </a:extLst>
           </p:cNvPr>
@@ -9597,7 +9597,7 @@
             <a:fld id="{055373AC-9AA7-423B-BA00-BA1C74164DBD}" type="datetime1">
               <a:rPr lang="en-US" smtClean="0"/>
               <a:pPr/>
-              <a:t>10/21/2019</a:t>
+              <a:t>11/5/2019</a:t>
             </a:fld>
             <a:endParaRPr lang="en-US" dirty="0"/>
           </a:p>
@@ -9608,7 +9608,7 @@
           <p:cNvPr id="7" name="Footer Placeholder 6">
             <a:extLst>
               <a:ext uri="{FF2B5EF4-FFF2-40B4-BE49-F238E27FC236}">
-                <a16:creationId xmlns:a16="http://schemas.microsoft.com/office/drawing/2014/main" id="{47141AFF-42FF-4AAA-A3FA-149DDA66FCC2}"/>
+                <a16:creationId xmlns:a16="http://schemas.microsoft.com/office/drawing/2014/main" xmlns="" id="{47141AFF-42FF-4AAA-A3FA-149DDA66FCC2}"/>
               </a:ext>
             </a:extLst>
           </p:cNvPr>
@@ -9633,7 +9633,7 @@
           <p:cNvPr id="8" name="Slide Number Placeholder 7">
             <a:extLst>
               <a:ext uri="{FF2B5EF4-FFF2-40B4-BE49-F238E27FC236}">
-                <a16:creationId xmlns:a16="http://schemas.microsoft.com/office/drawing/2014/main" id="{92B2616D-7BC8-4F96-B3A7-B299A353B427}"/>
+                <a16:creationId xmlns:a16="http://schemas.microsoft.com/office/drawing/2014/main" xmlns="" id="{92B2616D-7BC8-4F96-B3A7-B299A353B427}"/>
               </a:ext>
             </a:extLst>
           </p:cNvPr>
@@ -9671,7 +9671,7 @@
           <p:cNvPr id="15" name="Picture 14">
             <a:extLst>
               <a:ext uri="{FF2B5EF4-FFF2-40B4-BE49-F238E27FC236}">
-                <a16:creationId xmlns:a16="http://schemas.microsoft.com/office/drawing/2014/main" id="{23AACB49-5E4F-4436-9D82-E83B52A7FCB8}"/>
+                <a16:creationId xmlns:a16="http://schemas.microsoft.com/office/drawing/2014/main" xmlns="" id="{23AACB49-5E4F-4436-9D82-E83B52A7FCB8}"/>
               </a:ext>
             </a:extLst>
           </p:cNvPr>
@@ -9723,7 +9723,7 @@
   <p:hf hdr="0" ftr="0" dt="0"/>
   <p:extLst mod="1">
     <p:ext uri="{DCECCB84-F9BA-43D5-87BE-67443E8EF086}">
-      <p15:sldGuideLst xmlns:p15="http://schemas.microsoft.com/office/powerpoint/2012/main">
+      <p15:sldGuideLst xmlns:p15="http://schemas.microsoft.com/office/powerpoint/2012/main" xmlns="">
         <p15:guide id="1" orient="horz" pos="2160">
           <p15:clr>
             <a:srgbClr val="FBAE40"/>
@@ -9762,7 +9762,7 @@
           <p:cNvPr id="15" name="Picture 14">
             <a:extLst>
               <a:ext uri="{FF2B5EF4-FFF2-40B4-BE49-F238E27FC236}">
-                <a16:creationId xmlns:a16="http://schemas.microsoft.com/office/drawing/2014/main" id="{C19C6415-13AB-4677-935E-D11508C4AD27}"/>
+                <a16:creationId xmlns:a16="http://schemas.microsoft.com/office/drawing/2014/main" xmlns="" id="{C19C6415-13AB-4677-935E-D11508C4AD27}"/>
               </a:ext>
             </a:extLst>
           </p:cNvPr>
@@ -9791,7 +9791,7 @@
           <p:cNvPr id="13" name="Rectangle 12">
             <a:extLst>
               <a:ext uri="{FF2B5EF4-FFF2-40B4-BE49-F238E27FC236}">
-                <a16:creationId xmlns:a16="http://schemas.microsoft.com/office/drawing/2014/main" id="{4B4EBD86-A13A-41DF-A04E-EA4A858E8860}"/>
+                <a16:creationId xmlns:a16="http://schemas.microsoft.com/office/drawing/2014/main" xmlns="" id="{4B4EBD86-A13A-41DF-A04E-EA4A858E8860}"/>
               </a:ext>
             </a:extLst>
           </p:cNvPr>
@@ -9872,7 +9872,7 @@
           <p:cNvPr id="21" name="Text Placeholder 20">
             <a:extLst>
               <a:ext uri="{FF2B5EF4-FFF2-40B4-BE49-F238E27FC236}">
-                <a16:creationId xmlns:a16="http://schemas.microsoft.com/office/drawing/2014/main" id="{04F318BE-2BAD-4677-871C-D78A4BF0CBA6}"/>
+                <a16:creationId xmlns:a16="http://schemas.microsoft.com/office/drawing/2014/main" xmlns="" id="{04F318BE-2BAD-4677-871C-D78A4BF0CBA6}"/>
               </a:ext>
             </a:extLst>
           </p:cNvPr>
@@ -9920,7 +9920,7 @@
           <p:cNvPr id="6" name="Text Placeholder 5">
             <a:extLst>
               <a:ext uri="{FF2B5EF4-FFF2-40B4-BE49-F238E27FC236}">
-                <a16:creationId xmlns:a16="http://schemas.microsoft.com/office/drawing/2014/main" id="{3278A82F-5546-4977-9F75-2A933B415945}"/>
+                <a16:creationId xmlns:a16="http://schemas.microsoft.com/office/drawing/2014/main" xmlns="" id="{3278A82F-5546-4977-9F75-2A933B415945}"/>
               </a:ext>
             </a:extLst>
           </p:cNvPr>
@@ -10003,7 +10003,7 @@
           <p:cNvPr id="2" name="Title 1">
             <a:extLst>
               <a:ext uri="{FF2B5EF4-FFF2-40B4-BE49-F238E27FC236}">
-                <a16:creationId xmlns:a16="http://schemas.microsoft.com/office/drawing/2014/main" id="{03BA3E62-7E9B-447C-9045-B989874D05D3}"/>
+                <a16:creationId xmlns:a16="http://schemas.microsoft.com/office/drawing/2014/main" xmlns="" id="{03BA3E62-7E9B-447C-9045-B989874D05D3}"/>
               </a:ext>
             </a:extLst>
           </p:cNvPr>
@@ -10039,7 +10039,7 @@
           <p:cNvPr id="3" name="Date Placeholder 2">
             <a:extLst>
               <a:ext uri="{FF2B5EF4-FFF2-40B4-BE49-F238E27FC236}">
-                <a16:creationId xmlns:a16="http://schemas.microsoft.com/office/drawing/2014/main" id="{1557BD22-7B02-4D39-928A-4BAD0D84EC13}"/>
+                <a16:creationId xmlns:a16="http://schemas.microsoft.com/office/drawing/2014/main" xmlns="" id="{1557BD22-7B02-4D39-928A-4BAD0D84EC13}"/>
               </a:ext>
             </a:extLst>
           </p:cNvPr>
@@ -10058,7 +10058,7 @@
             <a:fld id="{055373AC-9AA7-423B-BA00-BA1C74164DBD}" type="datetime1">
               <a:rPr lang="en-US" smtClean="0"/>
               <a:pPr/>
-              <a:t>10/21/2019</a:t>
+              <a:t>11/5/2019</a:t>
             </a:fld>
             <a:endParaRPr lang="en-US" dirty="0"/>
           </a:p>
@@ -10069,7 +10069,7 @@
           <p:cNvPr id="4" name="Footer Placeholder 3">
             <a:extLst>
               <a:ext uri="{FF2B5EF4-FFF2-40B4-BE49-F238E27FC236}">
-                <a16:creationId xmlns:a16="http://schemas.microsoft.com/office/drawing/2014/main" id="{12DED1B3-84A5-43D8-8770-B2C1E963B681}"/>
+                <a16:creationId xmlns:a16="http://schemas.microsoft.com/office/drawing/2014/main" xmlns="" id="{12DED1B3-84A5-43D8-8770-B2C1E963B681}"/>
               </a:ext>
             </a:extLst>
           </p:cNvPr>
@@ -10094,7 +10094,7 @@
           <p:cNvPr id="5" name="Slide Number Placeholder 4">
             <a:extLst>
               <a:ext uri="{FF2B5EF4-FFF2-40B4-BE49-F238E27FC236}">
-                <a16:creationId xmlns:a16="http://schemas.microsoft.com/office/drawing/2014/main" id="{6213FF9B-335F-4699-94F7-E43CA829037E}"/>
+                <a16:creationId xmlns:a16="http://schemas.microsoft.com/office/drawing/2014/main" xmlns="" id="{6213FF9B-335F-4699-94F7-E43CA829037E}"/>
               </a:ext>
             </a:extLst>
           </p:cNvPr>
@@ -10124,7 +10124,7 @@
           <p:cNvPr id="11" name="Picture 10">
             <a:extLst>
               <a:ext uri="{FF2B5EF4-FFF2-40B4-BE49-F238E27FC236}">
-                <a16:creationId xmlns:a16="http://schemas.microsoft.com/office/drawing/2014/main" id="{2EB003D1-D2F8-474E-9E8E-075BE60E9273}"/>
+                <a16:creationId xmlns:a16="http://schemas.microsoft.com/office/drawing/2014/main" xmlns="" id="{2EB003D1-D2F8-474E-9E8E-075BE60E9273}"/>
               </a:ext>
             </a:extLst>
           </p:cNvPr>
@@ -10207,7 +10207,7 @@
           <p:cNvPr id="7" name="Date Placeholder 3">
             <a:extLst>
               <a:ext uri="{FF2B5EF4-FFF2-40B4-BE49-F238E27FC236}">
-                <a16:creationId xmlns:a16="http://schemas.microsoft.com/office/drawing/2014/main" id="{0403F5F2-BA1B-4A39-A03D-AD9E0469441C}"/>
+                <a16:creationId xmlns:a16="http://schemas.microsoft.com/office/drawing/2014/main" xmlns="" id="{0403F5F2-BA1B-4A39-A03D-AD9E0469441C}"/>
               </a:ext>
             </a:extLst>
           </p:cNvPr>
@@ -10242,7 +10242,7 @@
             <a:fld id="{055373AC-9AA7-423B-BA00-BA1C74164DBD}" type="datetime1">
               <a:rPr lang="en-US" smtClean="0"/>
               <a:pPr/>
-              <a:t>10/21/2019</a:t>
+              <a:t>11/5/2019</a:t>
             </a:fld>
             <a:endParaRPr lang="en-US" dirty="0"/>
           </a:p>
@@ -10253,7 +10253,7 @@
           <p:cNvPr id="8" name="Footer Placeholder 4">
             <a:extLst>
               <a:ext uri="{FF2B5EF4-FFF2-40B4-BE49-F238E27FC236}">
-                <a16:creationId xmlns:a16="http://schemas.microsoft.com/office/drawing/2014/main" id="{32BCD1B1-3A00-45B1-B516-6B8E7FBC47C4}"/>
+                <a16:creationId xmlns:a16="http://schemas.microsoft.com/office/drawing/2014/main" xmlns="" id="{32BCD1B1-3A00-45B1-B516-6B8E7FBC47C4}"/>
               </a:ext>
             </a:extLst>
           </p:cNvPr>
@@ -10294,7 +10294,7 @@
           <p:cNvPr id="9" name="Slide Number Placeholder 5">
             <a:extLst>
               <a:ext uri="{FF2B5EF4-FFF2-40B4-BE49-F238E27FC236}">
-                <a16:creationId xmlns:a16="http://schemas.microsoft.com/office/drawing/2014/main" id="{0902A4B2-CB08-42CE-A814-FBDF345C2F43}"/>
+                <a16:creationId xmlns:a16="http://schemas.microsoft.com/office/drawing/2014/main" xmlns="" id="{0902A4B2-CB08-42CE-A814-FBDF345C2F43}"/>
               </a:ext>
             </a:extLst>
           </p:cNvPr>
@@ -10340,7 +10340,7 @@
           <p:cNvPr id="10" name="Title Placeholder 1">
             <a:extLst>
               <a:ext uri="{FF2B5EF4-FFF2-40B4-BE49-F238E27FC236}">
-                <a16:creationId xmlns:a16="http://schemas.microsoft.com/office/drawing/2014/main" id="{B770C392-3003-4C35-9625-BB041F8257BA}"/>
+                <a16:creationId xmlns:a16="http://schemas.microsoft.com/office/drawing/2014/main" xmlns="" id="{B770C392-3003-4C35-9625-BB041F8257BA}"/>
               </a:ext>
             </a:extLst>
           </p:cNvPr>
@@ -10379,7 +10379,7 @@
           <p:cNvPr id="11" name="Text Placeholder 2">
             <a:extLst>
               <a:ext uri="{FF2B5EF4-FFF2-40B4-BE49-F238E27FC236}">
-                <a16:creationId xmlns:a16="http://schemas.microsoft.com/office/drawing/2014/main" id="{90CBFB32-9F46-4F2F-8A54-9EE8BED27855}"/>
+                <a16:creationId xmlns:a16="http://schemas.microsoft.com/office/drawing/2014/main" xmlns="" id="{90CBFB32-9F46-4F2F-8A54-9EE8BED27855}"/>
               </a:ext>
             </a:extLst>
           </p:cNvPr>
@@ -10757,7 +10757,7 @@
   </p:txStyles>
   <p:extLst mod="1">
     <p:ext uri="{27BBF7A9-308A-43DC-89C8-2F10F3537804}">
-      <p15:sldGuideLst xmlns:p15="http://schemas.microsoft.com/office/powerpoint/2012/main">
+      <p15:sldGuideLst xmlns:p15="http://schemas.microsoft.com/office/powerpoint/2012/main" xmlns="">
         <p15:guide id="3" orient="horz" pos="2160" userDrawn="1">
           <p15:clr>
             <a:srgbClr val="F26B43"/>
@@ -10935,7 +10935,7 @@
           <p:cNvPr id="1028" name="Picture 4" descr="Image result for ado png">
             <a:extLst>
               <a:ext uri="{FF2B5EF4-FFF2-40B4-BE49-F238E27FC236}">
-                <a16:creationId xmlns:a16="http://schemas.microsoft.com/office/drawing/2014/main" id="{1457C9A4-CF11-4122-BE5A-DA47323BCA45}"/>
+                <a16:creationId xmlns:a16="http://schemas.microsoft.com/office/drawing/2014/main" xmlns="" id="{1457C9A4-CF11-4122-BE5A-DA47323BCA45}"/>
               </a:ext>
             </a:extLst>
           </p:cNvPr>
@@ -11900,18 +11900,21 @@
           <a:lstStyle/>
           <a:p>
             <a:r>
-              <a:rPr lang="en-US"/>
-              <a:t>SqlClient and </a:t>
-            </a:r>
-            <a:r>
-              <a:rPr lang="bg-BG"/>
+              <a:rPr lang="en-US" dirty="0" err="1"/>
+              <a:t>SqlClient</a:t>
+            </a:r>
+            <a:r>
+              <a:rPr lang="en-US" dirty="0"/>
+              <a:t> and </a:t>
+            </a:r>
+            <a:r>
+              <a:rPr lang="bg-BG" dirty="0"/>
               <a:t>ADO.NET</a:t>
             </a:r>
             <a:r>
-              <a:rPr lang="en-US"/>
+              <a:rPr lang="en-US" dirty="0"/>
               <a:t> Connected Model</a:t>
             </a:r>
-            <a:endParaRPr lang="en-US" dirty="0"/>
           </a:p>
         </p:txBody>
       </p:sp>
@@ -13693,10 +13696,9 @@
           <a:lstStyle/>
           <a:p>
             <a:r>
-              <a:rPr lang="en-US"/>
+              <a:rPr lang="en-US" dirty="0"/>
               <a:t>ORM Model</a:t>
             </a:r>
-            <a:endParaRPr lang="en-US" dirty="0"/>
           </a:p>
         </p:txBody>
       </p:sp>
@@ -14812,10 +14814,9 @@
           <a:lstStyle/>
           <a:p>
             <a:r>
-              <a:rPr lang="en-US"/>
+              <a:rPr lang="en-US" dirty="0"/>
               <a:t>ORM Model – Benefits and Problems</a:t>
             </a:r>
-            <a:endParaRPr lang="en-US" dirty="0"/>
           </a:p>
         </p:txBody>
       </p:sp>
@@ -15323,10 +15324,9 @@
           <a:lstStyle/>
           <a:p>
             <a:r>
-              <a:rPr lang="en-US"/>
+              <a:rPr lang="en-US" dirty="0"/>
               <a:t>ADO.NET: Entity Framework Core</a:t>
             </a:r>
-            <a:endParaRPr lang="en-US" dirty="0"/>
           </a:p>
         </p:txBody>
       </p:sp>
@@ -15697,7 +15697,7 @@
           <p:cNvPr id="1030" name="Picture 6" descr="Related image">
             <a:extLst>
               <a:ext uri="{FF2B5EF4-FFF2-40B4-BE49-F238E27FC236}">
-                <a16:creationId xmlns:a16="http://schemas.microsoft.com/office/drawing/2014/main" id="{146B3E3C-0C0D-4D01-BD63-E81C5B5E9C3F}"/>
+                <a16:creationId xmlns:a16="http://schemas.microsoft.com/office/drawing/2014/main" xmlns="" id="{146B3E3C-0C0D-4D01-BD63-E81C5B5E9C3F}"/>
               </a:ext>
             </a:extLst>
           </p:cNvPr>
@@ -16352,7 +16352,7 @@
           <a:lstStyle/>
           <a:p>
             <a:r>
-              <a:rPr lang="en-US"/>
+              <a:rPr lang="en-US" dirty="0"/>
               <a:t>The </a:t>
             </a:r>
             <a:r>
@@ -16360,10 +16360,9 @@
               <a:t>SqlConnection</a:t>
             </a:r>
             <a:r>
-              <a:rPr lang="en-US"/>
+              <a:rPr lang="en-US" dirty="0"/>
               <a:t> Class</a:t>
             </a:r>
-            <a:endParaRPr lang="en-US" dirty="0"/>
           </a:p>
         </p:txBody>
       </p:sp>
@@ -18114,11 +18113,11 @@
               </a:buClr>
             </a:pPr>
             <a:r>
-              <a:rPr lang="en-US" dirty="0"/>
+              <a:rPr lang="en-US" dirty="0" smtClean="0"/>
               <a:t>Settings for </a:t>
             </a:r>
             <a:r>
-              <a:rPr lang="en-US" b="1" dirty="0">
+              <a:rPr lang="en-US" b="1" dirty="0" smtClean="0">
                 <a:solidFill>
                   <a:schemeClr val="bg1"/>
                 </a:solidFill>
@@ -18126,10 +18125,10 @@
               <a:t>SQL Server connections</a:t>
             </a:r>
             <a:r>
-              <a:rPr lang="en-US" dirty="0"/>
+              <a:rPr lang="en-US" dirty="0" smtClean="0"/>
               <a:t>:</a:t>
             </a:r>
-            <a:endParaRPr lang="bg-BG" dirty="0"/>
+            <a:endParaRPr lang="bg-BG" dirty="0" smtClean="0"/>
           </a:p>
           <a:p>
             <a:pPr lvl="1">
@@ -18138,12 +18137,20 @@
               </a:buClr>
             </a:pPr>
             <a:r>
+              <a:rPr lang="en-US" b="1" dirty="0" smtClean="0">
+                <a:solidFill>
+                  <a:schemeClr val="bg1"/>
+                </a:solidFill>
+              </a:rPr>
+              <a:t>Data </a:t>
+            </a:r>
+            <a:r>
               <a:rPr lang="en-US" b="1" dirty="0">
                 <a:solidFill>
                   <a:schemeClr val="bg1"/>
                 </a:solidFill>
               </a:rPr>
-              <a:t>Data Source</a:t>
+              <a:t>Source</a:t>
             </a:r>
             <a:r>
               <a:rPr lang="bg-BG" b="1" dirty="0">
@@ -18314,18 +18321,17 @@
           <a:lstStyle/>
           <a:p>
             <a:r>
-              <a:rPr lang="en-US"/>
+              <a:rPr lang="en-US" dirty="0"/>
               <a:t>DB Connection</a:t>
             </a:r>
             <a:r>
-              <a:rPr lang="bg-BG"/>
+              <a:rPr lang="bg-BG" dirty="0"/>
               <a:t> </a:t>
             </a:r>
             <a:r>
-              <a:rPr lang="en-US"/>
+              <a:rPr lang="en-US" dirty="0"/>
               <a:t>String</a:t>
             </a:r>
-            <a:endParaRPr lang="en-US" dirty="0"/>
           </a:p>
         </p:txBody>
       </p:sp>
@@ -18714,7 +18720,7 @@
           <p:cNvPr id="4" name="Title 3">
             <a:extLst>
               <a:ext uri="{FF2B5EF4-FFF2-40B4-BE49-F238E27FC236}">
-                <a16:creationId xmlns:a16="http://schemas.microsoft.com/office/drawing/2014/main" id="{DC603285-689A-4E41-8F77-BD9FEA5C433A}"/>
+                <a16:creationId xmlns:a16="http://schemas.microsoft.com/office/drawing/2014/main" xmlns="" id="{DC603285-689A-4E41-8F77-BD9FEA5C433A}"/>
               </a:ext>
             </a:extLst>
           </p:cNvPr>
@@ -18743,7 +18749,7 @@
           <p:cNvPr id="3" name="Content Placeholder 2">
             <a:extLst>
               <a:ext uri="{FF2B5EF4-FFF2-40B4-BE49-F238E27FC236}">
-                <a16:creationId xmlns:a16="http://schemas.microsoft.com/office/drawing/2014/main" id="{ACAA566F-0E0E-4BF9-A3B0-6F01080380A3}"/>
+                <a16:creationId xmlns:a16="http://schemas.microsoft.com/office/drawing/2014/main" xmlns="" id="{ACAA566F-0E0E-4BF9-A3B0-6F01080380A3}"/>
               </a:ext>
             </a:extLst>
           </p:cNvPr>
@@ -18802,7 +18808,7 @@
           <p:cNvPr id="2" name="Slide Number Placeholder 1">
             <a:extLst>
               <a:ext uri="{FF2B5EF4-FFF2-40B4-BE49-F238E27FC236}">
-                <a16:creationId xmlns:a16="http://schemas.microsoft.com/office/drawing/2014/main" id="{CA3C29A2-801E-45B5-8313-8492EDF9966A}"/>
+                <a16:creationId xmlns:a16="http://schemas.microsoft.com/office/drawing/2014/main" xmlns="" id="{CA3C29A2-801E-45B5-8313-8492EDF9966A}"/>
               </a:ext>
             </a:extLst>
           </p:cNvPr>
@@ -19180,11 +19186,11 @@
           <a:lstStyle/>
           <a:p>
             <a:r>
-              <a:rPr lang="en-US"/>
+              <a:rPr lang="en-US" dirty="0"/>
               <a:t>Working with</a:t>
             </a:r>
             <a:r>
-              <a:rPr lang="bg-BG"/>
+              <a:rPr lang="bg-BG" dirty="0"/>
               <a:t> SqlConnection</a:t>
             </a:r>
             <a:endParaRPr lang="en-US" dirty="0"/>
@@ -19220,7 +19226,7 @@
           <p:cNvPr id="2050" name="Picture 2" descr="Image result for sql png">
             <a:extLst>
               <a:ext uri="{FF2B5EF4-FFF2-40B4-BE49-F238E27FC236}">
-                <a16:creationId xmlns:a16="http://schemas.microsoft.com/office/drawing/2014/main" id="{FF857C3B-E42E-49B8-A96B-EC7828128B4A}"/>
+                <a16:creationId xmlns:a16="http://schemas.microsoft.com/office/drawing/2014/main" xmlns="" id="{FF857C3B-E42E-49B8-A96B-EC7828128B4A}"/>
               </a:ext>
             </a:extLst>
           </p:cNvPr>
@@ -19714,11 +19720,11 @@
           <a:lstStyle/>
           <a:p>
             <a:r>
-              <a:rPr lang="en-US"/>
+              <a:rPr lang="en-US" dirty="0"/>
               <a:t>The</a:t>
             </a:r>
             <a:r>
-              <a:rPr lang="bg-BG"/>
+              <a:rPr lang="bg-BG" dirty="0"/>
               <a:t> </a:t>
             </a:r>
             <a:r>
@@ -19726,10 +19732,9 @@
               <a:t>SqlCommand</a:t>
             </a:r>
             <a:r>
-              <a:rPr lang="en-US"/>
+              <a:rPr lang="en-US" dirty="0"/>
               <a:t> Class</a:t>
             </a:r>
-            <a:endParaRPr lang="en-US" dirty="0"/>
           </a:p>
         </p:txBody>
       </p:sp>
@@ -20244,10 +20249,9 @@
               <a:t>SqlCommand</a:t>
             </a:r>
             <a:r>
-              <a:rPr lang="en-US"/>
+              <a:rPr lang="en-US" dirty="0"/>
               <a:t> – Example</a:t>
             </a:r>
-            <a:endParaRPr lang="en-US" dirty="0"/>
           </a:p>
         </p:txBody>
       </p:sp>
@@ -21357,18 +21361,17 @@
           <a:lstStyle/>
           <a:p>
             <a:r>
-              <a:rPr lang="en-US"/>
+              <a:rPr lang="en-US" dirty="0"/>
               <a:t>The</a:t>
             </a:r>
             <a:r>
-              <a:rPr lang="bg-BG"/>
+              <a:rPr lang="bg-BG" dirty="0"/>
               <a:t> SqlDataReader</a:t>
             </a:r>
             <a:r>
-              <a:rPr lang="en-US"/>
+              <a:rPr lang="en-US" dirty="0"/>
               <a:t> Class</a:t>
             </a:r>
-            <a:endParaRPr lang="en-US" dirty="0"/>
           </a:p>
         </p:txBody>
       </p:sp>
@@ -23387,7 +23390,7 @@
           <p:cNvPr id="2" name="Text Placeholder 1">
             <a:extLst>
               <a:ext uri="{FF2B5EF4-FFF2-40B4-BE49-F238E27FC236}">
-                <a16:creationId xmlns:a16="http://schemas.microsoft.com/office/drawing/2014/main" id="{8593C9E5-A56C-494E-9FBC-FA93BD245733}"/>
+                <a16:creationId xmlns:a16="http://schemas.microsoft.com/office/drawing/2014/main" xmlns="" id="{8593C9E5-A56C-494E-9FBC-FA93BD245733}"/>
               </a:ext>
             </a:extLst>
           </p:cNvPr>
@@ -23415,7 +23418,7 @@
           <p:cNvPr id="3" name="Text Placeholder 2">
             <a:extLst>
               <a:ext uri="{FF2B5EF4-FFF2-40B4-BE49-F238E27FC236}">
-                <a16:creationId xmlns:a16="http://schemas.microsoft.com/office/drawing/2014/main" id="{60C15449-09B5-42ED-BD42-447201C7A1FD}"/>
+                <a16:creationId xmlns:a16="http://schemas.microsoft.com/office/drawing/2014/main" xmlns="" id="{60C15449-09B5-42ED-BD42-447201C7A1FD}"/>
               </a:ext>
             </a:extLst>
           </p:cNvPr>
@@ -23443,7 +23446,7 @@
           <p:cNvPr id="3074" name="Picture 2" descr="Image result for sql injection png">
             <a:extLst>
               <a:ext uri="{FF2B5EF4-FFF2-40B4-BE49-F238E27FC236}">
-                <a16:creationId xmlns:a16="http://schemas.microsoft.com/office/drawing/2014/main" id="{2EACDC4C-78C0-417C-BFA5-05D05A789382}"/>
+                <a16:creationId xmlns:a16="http://schemas.microsoft.com/office/drawing/2014/main" xmlns="" id="{2EACDC4C-78C0-417C-BFA5-05D05A789382}"/>
               </a:ext>
             </a:extLst>
           </p:cNvPr>
@@ -28100,7 +28103,7 @@
           <p:cNvPr id="2" name="Text Placeholder 1">
             <a:extLst>
               <a:ext uri="{FF2B5EF4-FFF2-40B4-BE49-F238E27FC236}">
-                <a16:creationId xmlns:a16="http://schemas.microsoft.com/office/drawing/2014/main" id="{8593C9E5-A56C-494E-9FBC-FA93BD245733}"/>
+                <a16:creationId xmlns:a16="http://schemas.microsoft.com/office/drawing/2014/main" xmlns="" id="{8593C9E5-A56C-494E-9FBC-FA93BD245733}"/>
               </a:ext>
             </a:extLst>
           </p:cNvPr>
@@ -28716,7 +28719,7 @@
           <p:cNvPr id="14" name="Text Placeholder 4">
             <a:extLst>
               <a:ext uri="{FF2B5EF4-FFF2-40B4-BE49-F238E27FC236}">
-                <a16:creationId xmlns:a16="http://schemas.microsoft.com/office/drawing/2014/main" id="{0E49D336-45B6-44D3-97C4-E28F8DEA2022}"/>
+                <a16:creationId xmlns:a16="http://schemas.microsoft.com/office/drawing/2014/main" xmlns="" id="{0E49D336-45B6-44D3-97C4-E28F8DEA2022}"/>
               </a:ext>
             </a:extLst>
           </p:cNvPr>
@@ -28858,7 +28861,7 @@
           <p:cNvPr id="9" name="Group 8">
             <a:extLst>
               <a:ext uri="{FF2B5EF4-FFF2-40B4-BE49-F238E27FC236}">
-                <a16:creationId xmlns:a16="http://schemas.microsoft.com/office/drawing/2014/main" id="{EBAFE522-EB7D-4931-A015-9A7E8A98517D}"/>
+                <a16:creationId xmlns:a16="http://schemas.microsoft.com/office/drawing/2014/main" xmlns="" id="{EBAFE522-EB7D-4931-A015-9A7E8A98517D}"/>
               </a:ext>
             </a:extLst>
           </p:cNvPr>
@@ -28878,7 +28881,7 @@
             <p:cNvPr id="10" name="Rounded Rectangle 10">
               <a:extLst>
                 <a:ext uri="{FF2B5EF4-FFF2-40B4-BE49-F238E27FC236}">
-                  <a16:creationId xmlns:a16="http://schemas.microsoft.com/office/drawing/2014/main" id="{18F78F23-3D09-4B63-8DF9-D49CFBB145EE}"/>
+                  <a16:creationId xmlns:a16="http://schemas.microsoft.com/office/drawing/2014/main" xmlns="" id="{18F78F23-3D09-4B63-8DF9-D49CFBB145EE}"/>
                 </a:ext>
               </a:extLst>
             </p:cNvPr>
@@ -28932,7 +28935,7 @@
             <p:cNvPr id="11" name="Rounded Rectangle 16">
               <a:extLst>
                 <a:ext uri="{FF2B5EF4-FFF2-40B4-BE49-F238E27FC236}">
-                  <a16:creationId xmlns:a16="http://schemas.microsoft.com/office/drawing/2014/main" id="{F12C06CE-2BBE-46C2-B718-813794C58DF9}"/>
+                  <a16:creationId xmlns:a16="http://schemas.microsoft.com/office/drawing/2014/main" xmlns="" id="{F12C06CE-2BBE-46C2-B718-813794C58DF9}"/>
                 </a:ext>
               </a:extLst>
             </p:cNvPr>
@@ -28992,7 +28995,7 @@
             <p:cNvPr id="12" name="Half Frame 11">
               <a:extLst>
                 <a:ext uri="{FF2B5EF4-FFF2-40B4-BE49-F238E27FC236}">
-                  <a16:creationId xmlns:a16="http://schemas.microsoft.com/office/drawing/2014/main" id="{66CDBB1E-AF3C-43FC-9F34-2DD691F81726}"/>
+                  <a16:creationId xmlns:a16="http://schemas.microsoft.com/office/drawing/2014/main" xmlns="" id="{66CDBB1E-AF3C-43FC-9F34-2DD691F81726}"/>
                 </a:ext>
               </a:extLst>
             </p:cNvPr>
@@ -29054,7 +29057,7 @@
           <p:cNvPr id="13" name="Picture 12">
             <a:extLst>
               <a:ext uri="{FF2B5EF4-FFF2-40B4-BE49-F238E27FC236}">
-                <a16:creationId xmlns:a16="http://schemas.microsoft.com/office/drawing/2014/main" id="{CCC3A316-993C-4741-8826-E104F27650A3}"/>
+                <a16:creationId xmlns:a16="http://schemas.microsoft.com/office/drawing/2014/main" xmlns="" id="{CCC3A316-993C-4741-8826-E104F27650A3}"/>
               </a:ext>
             </a:extLst>
           </p:cNvPr>
@@ -29089,7 +29092,7 @@
           <p:cNvPr id="15" name="Content Placeholder 4">
             <a:extLst>
               <a:ext uri="{FF2B5EF4-FFF2-40B4-BE49-F238E27FC236}">
-                <a16:creationId xmlns:a16="http://schemas.microsoft.com/office/drawing/2014/main" id="{B96A0DF8-27E7-4DC8-BBE3-7238AAAEB845}"/>
+                <a16:creationId xmlns:a16="http://schemas.microsoft.com/office/drawing/2014/main" xmlns="" id="{B96A0DF8-27E7-4DC8-BBE3-7238AAAEB845}"/>
               </a:ext>
             </a:extLst>
           </p:cNvPr>
@@ -30047,7 +30050,7 @@
             <a:hlinkClick r:id="rId23"/>
             <a:extLst>
               <a:ext uri="{FF2B5EF4-FFF2-40B4-BE49-F238E27FC236}">
-                <a16:creationId xmlns:a16="http://schemas.microsoft.com/office/drawing/2014/main" id="{0FDF11E6-F5ED-4FB2-96CD-9D306D28A0DB}"/>
+                <a16:creationId xmlns:a16="http://schemas.microsoft.com/office/drawing/2014/main" xmlns="" id="{0FDF11E6-F5ED-4FB2-96CD-9D306D28A0DB}"/>
               </a:ext>
             </a:extLst>
           </p:cNvPr>
@@ -30202,7 +30205,7 @@
           <p:cNvPr id="7" name="Group 6">
             <a:extLst>
               <a:ext uri="{FF2B5EF4-FFF2-40B4-BE49-F238E27FC236}">
-                <a16:creationId xmlns:a16="http://schemas.microsoft.com/office/drawing/2014/main" id="{8F94737B-4698-41F8-AC81-9324F12880B9}"/>
+                <a16:creationId xmlns:a16="http://schemas.microsoft.com/office/drawing/2014/main" xmlns="" id="{8F94737B-4698-41F8-AC81-9324F12880B9}"/>
               </a:ext>
             </a:extLst>
           </p:cNvPr>
@@ -30612,7 +30615,7 @@
             <a:hlinkClick r:id="rId7"/>
             <a:extLst>
               <a:ext uri="{FF2B5EF4-FFF2-40B4-BE49-F238E27FC236}">
-                <a16:creationId xmlns:a16="http://schemas.microsoft.com/office/drawing/2014/main" id="{FF8B5863-FC71-441D-893C-E681B70BF35C}"/>
+                <a16:creationId xmlns:a16="http://schemas.microsoft.com/office/drawing/2014/main" xmlns="" id="{FF8B5863-FC71-441D-893C-E681B70BF35C}"/>
               </a:ext>
             </a:extLst>
           </p:cNvPr>
@@ -30649,7 +30652,7 @@
             <a:hlinkClick r:id="rId3"/>
             <a:extLst>
               <a:ext uri="{FF2B5EF4-FFF2-40B4-BE49-F238E27FC236}">
-                <a16:creationId xmlns:a16="http://schemas.microsoft.com/office/drawing/2014/main" id="{5AC70220-7037-4082-BB2D-BF1E99F91E0D}"/>
+                <a16:creationId xmlns:a16="http://schemas.microsoft.com/office/drawing/2014/main" xmlns="" id="{5AC70220-7037-4082-BB2D-BF1E99F91E0D}"/>
               </a:ext>
             </a:extLst>
           </p:cNvPr>
@@ -30686,7 +30689,7 @@
             <a:hlinkClick r:id="rId10" tooltip="Software University @ Facebook"/>
             <a:extLst>
               <a:ext uri="{FF2B5EF4-FFF2-40B4-BE49-F238E27FC236}">
-                <a16:creationId xmlns:a16="http://schemas.microsoft.com/office/drawing/2014/main" id="{7DE74804-3B64-4B79-BDD0-3E400F9EC1FD}"/>
+                <a16:creationId xmlns:a16="http://schemas.microsoft.com/office/drawing/2014/main" xmlns="" id="{7DE74804-3B64-4B79-BDD0-3E400F9EC1FD}"/>
               </a:ext>
             </a:extLst>
           </p:cNvPr>
@@ -30733,7 +30736,7 @@
             <a:hlinkClick r:id="rId6" tooltip="Software University Discussion Forum"/>
             <a:extLst>
               <a:ext uri="{FF2B5EF4-FFF2-40B4-BE49-F238E27FC236}">
-                <a16:creationId xmlns:a16="http://schemas.microsoft.com/office/drawing/2014/main" id="{E65F0011-8B8E-4A02-A422-9662ADE13CB5}"/>
+                <a16:creationId xmlns:a16="http://schemas.microsoft.com/office/drawing/2014/main" xmlns="" id="{E65F0011-8B8E-4A02-A422-9662ADE13CB5}"/>
               </a:ext>
             </a:extLst>
           </p:cNvPr>
@@ -31021,7 +31024,7 @@
           <p:cNvPr id="7" name="Text Placeholder 6">
             <a:extLst>
               <a:ext uri="{FF2B5EF4-FFF2-40B4-BE49-F238E27FC236}">
-                <a16:creationId xmlns:a16="http://schemas.microsoft.com/office/drawing/2014/main" id="{A688D22A-6167-4B35-848C-430A24E1D2A6}"/>
+                <a16:creationId xmlns:a16="http://schemas.microsoft.com/office/drawing/2014/main" xmlns="" id="{A688D22A-6167-4B35-848C-430A24E1D2A6}"/>
               </a:ext>
             </a:extLst>
           </p:cNvPr>
@@ -32886,19 +32889,19 @@
           <a:lstStyle/>
           <a:p>
             <a:r>
-              <a:rPr lang="en-US"/>
+              <a:rPr lang="en-US" dirty="0"/>
               <a:t>What Is</a:t>
             </a:r>
             <a:r>
-              <a:rPr lang="bg-BG"/>
+              <a:rPr lang="bg-BG" dirty="0"/>
               <a:t> </a:t>
             </a:r>
             <a:r>
-              <a:rPr lang="en-US"/>
+              <a:rPr lang="en-US" dirty="0"/>
               <a:t>ADO.NET</a:t>
             </a:r>
             <a:r>
-              <a:rPr lang="bg-BG"/>
+              <a:rPr lang="bg-BG" dirty="0"/>
               <a:t>?</a:t>
             </a:r>
             <a:endParaRPr lang="en-US" dirty="0"/>
@@ -33365,7 +33368,7 @@
           <a:lstStyle/>
           <a:p>
             <a:r>
-              <a:rPr lang="en-US"/>
+              <a:rPr lang="en-US" dirty="0"/>
               <a:t>Data Providers in ADO.NET</a:t>
             </a:r>
             <a:endParaRPr lang="bg-BG" dirty="0"/>
@@ -34050,7 +34053,7 @@
   <a:extraClrSchemeLst/>
   <a:extLst>
     <a:ext uri="{05A4C25C-085E-4340-85A3-A5531E510DB2}">
-      <thm15:themeFamily xmlns:thm15="http://schemas.microsoft.com/office/thememl/2012/main" name="SoftUni3_1" id="{D61FAD9B-6E74-4E03-BFE4-B363D484F1DA}" vid="{7089C1A3-635B-4B03-A017-DAF10A3A396B}"/>
+      <thm15:themeFamily xmlns:thm15="http://schemas.microsoft.com/office/thememl/2012/main" xmlns="" name="SoftUni3_1" id="{D61FAD9B-6E74-4E03-BFE4-B363D484F1DA}" vid="{7089C1A3-635B-4B03-A017-DAF10A3A396B}"/>
     </a:ext>
   </a:extLst>
 </a:theme>

</xml_diff>